<commit_message>
Final verze prezentace k obhajobě
</commit_message>
<xml_diff>
--- a/docs/p2ppost_prezentace.pptx
+++ b/docs/p2ppost_prezentace.pptx
@@ -5,7 +5,7 @@
     <p:sldMasterId id="2147483672" r:id="rId1"/>
   </p:sldMasterIdLst>
   <p:notesMasterIdLst>
-    <p:notesMasterId r:id="rId26"/>
+    <p:notesMasterId r:id="rId27"/>
   </p:notesMasterIdLst>
   <p:sldIdLst>
     <p:sldId id="256" r:id="rId2"/>
@@ -29,9 +29,10 @@
     <p:sldId id="284" r:id="rId20"/>
     <p:sldId id="285" r:id="rId21"/>
     <p:sldId id="286" r:id="rId22"/>
-    <p:sldId id="287" r:id="rId23"/>
-    <p:sldId id="280" r:id="rId24"/>
-    <p:sldId id="282" r:id="rId25"/>
+    <p:sldId id="288" r:id="rId23"/>
+    <p:sldId id="287" r:id="rId24"/>
+    <p:sldId id="280" r:id="rId25"/>
+    <p:sldId id="282" r:id="rId26"/>
   </p:sldIdLst>
   <p:sldSz cx="12192000" cy="6858000"/>
   <p:notesSz cx="6858000" cy="9144000"/>
@@ -11022,10 +11023,10 @@
       </p:sp>
       <p:pic>
         <p:nvPicPr>
-          <p:cNvPr id="3" name="Obrázek 2">
-            <a:extLst>
-              <a:ext uri="{FF2B5EF4-FFF2-40B4-BE49-F238E27FC236}">
-                <a16:creationId xmlns:a16="http://schemas.microsoft.com/office/drawing/2014/main" id="{F7A4DDA0-8B94-56C8-1F05-7AEF96CBCCBB}"/>
+          <p:cNvPr id="4" name="Obrázek 3">
+            <a:extLst>
+              <a:ext uri="{FF2B5EF4-FFF2-40B4-BE49-F238E27FC236}">
+                <a16:creationId xmlns:a16="http://schemas.microsoft.com/office/drawing/2014/main" id="{6EB2EAA5-AB10-4729-3F72-024D44311341}"/>
               </a:ext>
             </a:extLst>
           </p:cNvPr>
@@ -11036,36 +11037,6 @@
         </p:nvPicPr>
         <p:blipFill>
           <a:blip r:embed="rId2"/>
-          <a:stretch>
-            <a:fillRect/>
-          </a:stretch>
-        </p:blipFill>
-        <p:spPr>
-          <a:xfrm>
-            <a:off x="1962150" y="1431820"/>
-            <a:ext cx="8267700" cy="4400550"/>
-          </a:xfrm>
-          <a:prstGeom prst="rect">
-            <a:avLst/>
-          </a:prstGeom>
-        </p:spPr>
-      </p:pic>
-      <p:pic>
-        <p:nvPicPr>
-          <p:cNvPr id="4" name="Obrázek 3">
-            <a:extLst>
-              <a:ext uri="{FF2B5EF4-FFF2-40B4-BE49-F238E27FC236}">
-                <a16:creationId xmlns:a16="http://schemas.microsoft.com/office/drawing/2014/main" id="{6EB2EAA5-AB10-4729-3F72-024D44311341}"/>
-              </a:ext>
-            </a:extLst>
-          </p:cNvPr>
-          <p:cNvPicPr>
-            <a:picLocks noChangeAspect="1"/>
-          </p:cNvPicPr>
-          <p:nvPr/>
-        </p:nvPicPr>
-        <p:blipFill>
-          <a:blip r:embed="rId3"/>
           <a:stretch>
             <a:fillRect/>
           </a:stretch>
@@ -11132,6 +11103,310 @@
           </a:p>
         </p:txBody>
       </p:sp>
+      <p:pic>
+        <p:nvPicPr>
+          <p:cNvPr id="11" name="Obrázek 10">
+            <a:extLst>
+              <a:ext uri="{FF2B5EF4-FFF2-40B4-BE49-F238E27FC236}">
+                <a16:creationId xmlns:a16="http://schemas.microsoft.com/office/drawing/2014/main" id="{130EC6F6-3B02-7021-06A8-44EAD4D92E3E}"/>
+              </a:ext>
+            </a:extLst>
+          </p:cNvPr>
+          <p:cNvPicPr>
+            <a:picLocks noChangeAspect="1"/>
+          </p:cNvPicPr>
+          <p:nvPr/>
+        </p:nvPicPr>
+        <p:blipFill>
+          <a:blip r:embed="rId3"/>
+          <a:stretch>
+            <a:fillRect/>
+          </a:stretch>
+        </p:blipFill>
+        <p:spPr>
+          <a:xfrm>
+            <a:off x="1847613" y="4899346"/>
+            <a:ext cx="8248650" cy="1323975"/>
+          </a:xfrm>
+          <a:prstGeom prst="rect">
+            <a:avLst/>
+          </a:prstGeom>
+        </p:spPr>
+      </p:pic>
+      <p:pic>
+        <p:nvPicPr>
+          <p:cNvPr id="13" name="Obrázek 12">
+            <a:extLst>
+              <a:ext uri="{FF2B5EF4-FFF2-40B4-BE49-F238E27FC236}">
+                <a16:creationId xmlns:a16="http://schemas.microsoft.com/office/drawing/2014/main" id="{26AFBEF9-13C3-A8BB-881B-632CE333EA80}"/>
+              </a:ext>
+            </a:extLst>
+          </p:cNvPr>
+          <p:cNvPicPr>
+            <a:picLocks noChangeAspect="1"/>
+          </p:cNvPicPr>
+          <p:nvPr/>
+        </p:nvPicPr>
+        <p:blipFill>
+          <a:blip r:embed="rId4"/>
+          <a:stretch>
+            <a:fillRect/>
+          </a:stretch>
+        </p:blipFill>
+        <p:spPr>
+          <a:xfrm>
+            <a:off x="1971675" y="1946347"/>
+            <a:ext cx="8201025" cy="2438400"/>
+          </a:xfrm>
+          <a:prstGeom prst="rect">
+            <a:avLst/>
+          </a:prstGeom>
+        </p:spPr>
+      </p:pic>
+      <p:sp>
+        <p:nvSpPr>
+          <p:cNvPr id="14" name="TextovéPole 13">
+            <a:extLst>
+              <a:ext uri="{FF2B5EF4-FFF2-40B4-BE49-F238E27FC236}">
+                <a16:creationId xmlns:a16="http://schemas.microsoft.com/office/drawing/2014/main" id="{B616CBCD-D67E-29C2-AA99-9EDB25257730}"/>
+              </a:ext>
+            </a:extLst>
+          </p:cNvPr>
+          <p:cNvSpPr txBox="1"/>
+          <p:nvPr/>
+        </p:nvSpPr>
+        <p:spPr>
+          <a:xfrm>
+            <a:off x="666278" y="1296666"/>
+            <a:ext cx="10611321" cy="523220"/>
+          </a:xfrm>
+          <a:prstGeom prst="rect">
+            <a:avLst/>
+          </a:prstGeom>
+          <a:noFill/>
+        </p:spPr>
+        <p:txBody>
+          <a:bodyPr wrap="square" rtlCol="0">
+            <a:spAutoFit/>
+          </a:bodyPr>
+          <a:lstStyle/>
+          <a:p>
+            <a:r>
+              <a:rPr lang="en-GB" sz="2800" b="1" i="0" dirty="0" err="1">
+                <a:solidFill>
+                  <a:srgbClr val="030712"/>
+                </a:solidFill>
+                <a:effectLst/>
+                <a:latin typeface="ui-sans-serif"/>
+              </a:rPr>
+              <a:t>Nejlepší</a:t>
+            </a:r>
+            <a:r>
+              <a:rPr lang="en-GB" sz="2800" b="1" i="0" dirty="0">
+                <a:solidFill>
+                  <a:srgbClr val="030712"/>
+                </a:solidFill>
+                <a:effectLst/>
+                <a:latin typeface="ui-sans-serif"/>
+              </a:rPr>
+              <a:t> </a:t>
+            </a:r>
+            <a:r>
+              <a:rPr lang="en-GB" sz="2800" b="1" i="0" dirty="0" err="1">
+                <a:solidFill>
+                  <a:srgbClr val="030712"/>
+                </a:solidFill>
+                <a:effectLst/>
+                <a:latin typeface="ui-sans-serif"/>
+              </a:rPr>
+              <a:t>kombinace</a:t>
+            </a:r>
+            <a:r>
+              <a:rPr lang="en-GB" sz="2800" b="1" i="0" dirty="0">
+                <a:solidFill>
+                  <a:srgbClr val="030712"/>
+                </a:solidFill>
+                <a:effectLst/>
+                <a:latin typeface="ui-sans-serif"/>
+              </a:rPr>
+              <a:t> pro </a:t>
+            </a:r>
+            <a:r>
+              <a:rPr lang="en-GB" sz="2800" b="1" i="0" dirty="0" err="1">
+                <a:solidFill>
+                  <a:srgbClr val="030712"/>
+                </a:solidFill>
+                <a:effectLst/>
+                <a:latin typeface="ui-sans-serif"/>
+              </a:rPr>
+              <a:t>přenos</a:t>
+            </a:r>
+            <a:r>
+              <a:rPr lang="en-GB" sz="2800" b="1" i="0" dirty="0">
+                <a:solidFill>
+                  <a:srgbClr val="030712"/>
+                </a:solidFill>
+                <a:effectLst/>
+                <a:latin typeface="ui-sans-serif"/>
+              </a:rPr>
+              <a:t> </a:t>
+            </a:r>
+            <a:r>
+              <a:rPr lang="en-GB" sz="2800" b="1" i="0" dirty="0" err="1">
+                <a:solidFill>
+                  <a:srgbClr val="030712"/>
+                </a:solidFill>
+                <a:effectLst/>
+                <a:latin typeface="ui-sans-serif"/>
+              </a:rPr>
+              <a:t>souborů</a:t>
+            </a:r>
+            <a:r>
+              <a:rPr lang="en-GB" sz="2800" b="1" i="0" dirty="0">
+                <a:solidFill>
+                  <a:srgbClr val="030712"/>
+                </a:solidFill>
+                <a:effectLst/>
+                <a:latin typeface="ui-sans-serif"/>
+              </a:rPr>
+              <a:t> (</a:t>
+            </a:r>
+            <a:r>
+              <a:rPr lang="en-GB" sz="2800" b="1" i="0" dirty="0" err="1">
+                <a:solidFill>
+                  <a:srgbClr val="030712"/>
+                </a:solidFill>
+                <a:effectLst/>
+                <a:latin typeface="ui-sans-serif"/>
+              </a:rPr>
+              <a:t>průměr</a:t>
+            </a:r>
+            <a:r>
+              <a:rPr lang="en-GB" sz="2800" b="1" i="0" dirty="0">
+                <a:solidFill>
+                  <a:srgbClr val="030712"/>
+                </a:solidFill>
+                <a:effectLst/>
+                <a:latin typeface="ui-sans-serif"/>
+              </a:rPr>
+              <a:t> </a:t>
+            </a:r>
+            <a:r>
+              <a:rPr lang="en-GB" sz="2800" b="1" i="0" dirty="0" err="1">
+                <a:solidFill>
+                  <a:srgbClr val="030712"/>
+                </a:solidFill>
+                <a:effectLst/>
+                <a:latin typeface="ui-sans-serif"/>
+              </a:rPr>
+              <a:t>všech</a:t>
+            </a:r>
+            <a:r>
+              <a:rPr lang="en-GB" sz="2800" b="1" i="0" dirty="0">
+                <a:solidFill>
+                  <a:srgbClr val="030712"/>
+                </a:solidFill>
+                <a:effectLst/>
+                <a:latin typeface="ui-sans-serif"/>
+              </a:rPr>
+              <a:t> </a:t>
+            </a:r>
+            <a:r>
+              <a:rPr lang="en-GB" sz="2800" b="1" i="0" dirty="0" err="1">
+                <a:solidFill>
+                  <a:srgbClr val="030712"/>
+                </a:solidFill>
+                <a:effectLst/>
+                <a:latin typeface="ui-sans-serif"/>
+              </a:rPr>
+              <a:t>velikostí</a:t>
+            </a:r>
+            <a:r>
+              <a:rPr lang="en-GB" sz="2800" b="1" i="0" dirty="0">
+                <a:solidFill>
+                  <a:srgbClr val="030712"/>
+                </a:solidFill>
+                <a:effectLst/>
+                <a:latin typeface="ui-sans-serif"/>
+              </a:rPr>
+              <a:t>)</a:t>
+            </a:r>
+            <a:endParaRPr lang="en-GB" sz="2800" b="1" dirty="0"/>
+          </a:p>
+        </p:txBody>
+      </p:sp>
+      <p:sp>
+        <p:nvSpPr>
+          <p:cNvPr id="15" name="TextovéPole 14">
+            <a:extLst>
+              <a:ext uri="{FF2B5EF4-FFF2-40B4-BE49-F238E27FC236}">
+                <a16:creationId xmlns:a16="http://schemas.microsoft.com/office/drawing/2014/main" id="{AF65B11A-6B6B-D46F-9AC7-84688B6894D3}"/>
+              </a:ext>
+            </a:extLst>
+          </p:cNvPr>
+          <p:cNvSpPr txBox="1"/>
+          <p:nvPr/>
+        </p:nvSpPr>
+        <p:spPr>
+          <a:xfrm>
+            <a:off x="578533" y="4376126"/>
+            <a:ext cx="10611321" cy="523220"/>
+          </a:xfrm>
+          <a:prstGeom prst="rect">
+            <a:avLst/>
+          </a:prstGeom>
+          <a:noFill/>
+        </p:spPr>
+        <p:txBody>
+          <a:bodyPr wrap="square" rtlCol="0">
+            <a:spAutoFit/>
+          </a:bodyPr>
+          <a:lstStyle/>
+          <a:p>
+            <a:r>
+              <a:rPr lang="en-GB" sz="2800" b="1" i="0" dirty="0">
+                <a:solidFill>
+                  <a:srgbClr val="030712"/>
+                </a:solidFill>
+                <a:effectLst/>
+                <a:latin typeface="ui-sans-serif"/>
+              </a:rPr>
+              <a:t>Nej</a:t>
+            </a:r>
+            <a:r>
+              <a:rPr lang="cs-CZ" sz="2800" b="1" i="0" dirty="0">
+                <a:solidFill>
+                  <a:srgbClr val="030712"/>
+                </a:solidFill>
+                <a:effectLst/>
+                <a:latin typeface="ui-sans-serif"/>
+              </a:rPr>
+              <a:t>pomalejší</a:t>
+            </a:r>
+            <a:r>
+              <a:rPr lang="en-GB" sz="2800" b="1" i="0" dirty="0">
+                <a:solidFill>
+                  <a:srgbClr val="030712"/>
+                </a:solidFill>
+                <a:effectLst/>
+                <a:latin typeface="ui-sans-serif"/>
+              </a:rPr>
+              <a:t> </a:t>
+            </a:r>
+            <a:r>
+              <a:rPr lang="cs-CZ" sz="2800" b="1" i="0" dirty="0">
+                <a:solidFill>
+                  <a:srgbClr val="030712"/>
+                </a:solidFill>
+                <a:effectLst/>
+                <a:latin typeface="ui-sans-serif"/>
+              </a:rPr>
+              <a:t>kombinace</a:t>
+            </a:r>
+            <a:endParaRPr lang="en-GB" sz="2800" b="1" dirty="0"/>
+          </a:p>
+        </p:txBody>
+      </p:sp>
     </p:spTree>
     <p:extLst>
       <p:ext uri="{BB962C8B-B14F-4D97-AF65-F5344CB8AC3E}">
@@ -11153,7 +11428,7 @@
         <p:cNvPr id="1" name="">
           <a:extLst>
             <a:ext uri="{FF2B5EF4-FFF2-40B4-BE49-F238E27FC236}">
-              <a16:creationId xmlns:a16="http://schemas.microsoft.com/office/drawing/2014/main" id="{29BB4504-5457-1463-5149-903402E74F92}"/>
+              <a16:creationId xmlns:a16="http://schemas.microsoft.com/office/drawing/2014/main" id="{0B4BE4D2-D3D4-BAF6-144A-DA123BA121CB}"/>
             </a:ext>
           </a:extLst>
         </p:cNvPr>
@@ -11173,7 +11448,7 @@
           <p:cNvPr id="5" name="Zástupný symbol pro číslo snímku 4">
             <a:extLst>
               <a:ext uri="{FF2B5EF4-FFF2-40B4-BE49-F238E27FC236}">
-                <a16:creationId xmlns:a16="http://schemas.microsoft.com/office/drawing/2014/main" id="{796AE311-FBC2-505E-6188-EE4F3414063E}"/>
+                <a16:creationId xmlns:a16="http://schemas.microsoft.com/office/drawing/2014/main" id="{0A9818D7-F494-2CD9-C2F9-70CAD28D1430}"/>
               </a:ext>
             </a:extLst>
           </p:cNvPr>
@@ -11202,7 +11477,7 @@
           <p:cNvPr id="6" name="Obdélník 5">
             <a:extLst>
               <a:ext uri="{FF2B5EF4-FFF2-40B4-BE49-F238E27FC236}">
-                <a16:creationId xmlns:a16="http://schemas.microsoft.com/office/drawing/2014/main" id="{2EB3FCC7-3D36-2684-F855-D227E243308F}"/>
+                <a16:creationId xmlns:a16="http://schemas.microsoft.com/office/drawing/2014/main" id="{DE80FE70-CAEB-F9F4-2EEA-E1E9F114844D}"/>
               </a:ext>
             </a:extLst>
           </p:cNvPr>
@@ -11254,7 +11529,7 @@
           <p:cNvPr id="7" name="Nadpis 1">
             <a:extLst>
               <a:ext uri="{FF2B5EF4-FFF2-40B4-BE49-F238E27FC236}">
-                <a16:creationId xmlns:a16="http://schemas.microsoft.com/office/drawing/2014/main" id="{6C6303FB-B554-9572-DBBC-98BDE67DCB19}"/>
+                <a16:creationId xmlns:a16="http://schemas.microsoft.com/office/drawing/2014/main" id="{4000DBA2-AFB6-D09B-B477-AF0C312BCA16}"/>
               </a:ext>
             </a:extLst>
           </p:cNvPr>
@@ -11281,7 +11556,7 @@
                   <a:srgbClr val="FF0000"/>
                 </a:solidFill>
               </a:rPr>
-              <a:t>Doporučení na základě testování</a:t>
+              <a:t>Výsledky testování</a:t>
             </a:r>
             <a:endParaRPr lang="en-GB" dirty="0">
               <a:solidFill>
@@ -11296,7 +11571,7 @@
           <p:cNvPr id="4" name="Obrázek 3">
             <a:extLst>
               <a:ext uri="{FF2B5EF4-FFF2-40B4-BE49-F238E27FC236}">
-                <a16:creationId xmlns:a16="http://schemas.microsoft.com/office/drawing/2014/main" id="{B6A6BA83-EB57-899F-D8DD-F0062A3CE0A7}"/>
+                <a16:creationId xmlns:a16="http://schemas.microsoft.com/office/drawing/2014/main" id="{545F3921-CA5B-C80A-BE18-2817F382829C}"/>
               </a:ext>
             </a:extLst>
           </p:cNvPr>
@@ -11307,36 +11582,6 @@
         </p:nvPicPr>
         <p:blipFill>
           <a:blip r:embed="rId2"/>
-          <a:stretch>
-            <a:fillRect/>
-          </a:stretch>
-        </p:blipFill>
-        <p:spPr>
-          <a:xfrm>
-            <a:off x="1985962" y="1281112"/>
-            <a:ext cx="8220075" cy="4295775"/>
-          </a:xfrm>
-          <a:prstGeom prst="rect">
-            <a:avLst/>
-          </a:prstGeom>
-        </p:spPr>
-      </p:pic>
-      <p:pic>
-        <p:nvPicPr>
-          <p:cNvPr id="8" name="Obrázek 7">
-            <a:extLst>
-              <a:ext uri="{FF2B5EF4-FFF2-40B4-BE49-F238E27FC236}">
-                <a16:creationId xmlns:a16="http://schemas.microsoft.com/office/drawing/2014/main" id="{58C15B4E-3796-771D-47A8-1F0248B0A66D}"/>
-              </a:ext>
-            </a:extLst>
-          </p:cNvPr>
-          <p:cNvPicPr>
-            <a:picLocks noChangeAspect="1"/>
-          </p:cNvPicPr>
-          <p:nvPr/>
-        </p:nvPicPr>
-        <p:blipFill>
-          <a:blip r:embed="rId3"/>
           <a:stretch>
             <a:fillRect/>
           </a:stretch>
@@ -11353,10 +11598,10 @@
       </p:pic>
       <p:sp>
         <p:nvSpPr>
-          <p:cNvPr id="9" name="Obdélník 8">
-            <a:extLst>
-              <a:ext uri="{FF2B5EF4-FFF2-40B4-BE49-F238E27FC236}">
-                <a16:creationId xmlns:a16="http://schemas.microsoft.com/office/drawing/2014/main" id="{4DC50664-6B0E-858D-A60C-3FDB2FAD98CE}"/>
+          <p:cNvPr id="8" name="Obdélník 7">
+            <a:extLst>
+              <a:ext uri="{FF2B5EF4-FFF2-40B4-BE49-F238E27FC236}">
+                <a16:creationId xmlns:a16="http://schemas.microsoft.com/office/drawing/2014/main" id="{B50F18CF-E31D-FF68-A870-E31A200F2F9E}"/>
               </a:ext>
             </a:extLst>
           </p:cNvPr>
@@ -11403,10 +11648,162 @@
           </a:p>
         </p:txBody>
       </p:sp>
+      <p:pic>
+        <p:nvPicPr>
+          <p:cNvPr id="9" name="Obrázek 8">
+            <a:extLst>
+              <a:ext uri="{FF2B5EF4-FFF2-40B4-BE49-F238E27FC236}">
+                <a16:creationId xmlns:a16="http://schemas.microsoft.com/office/drawing/2014/main" id="{4C54FCB8-304C-DC5C-9158-D04673F9CAAB}"/>
+              </a:ext>
+            </a:extLst>
+          </p:cNvPr>
+          <p:cNvPicPr>
+            <a:picLocks noChangeAspect="1"/>
+          </p:cNvPicPr>
+          <p:nvPr/>
+        </p:nvPicPr>
+        <p:blipFill>
+          <a:blip r:embed="rId3"/>
+          <a:stretch>
+            <a:fillRect/>
+          </a:stretch>
+        </p:blipFill>
+        <p:spPr>
+          <a:xfrm>
+            <a:off x="1850159" y="2175600"/>
+            <a:ext cx="8343900" cy="3648075"/>
+          </a:xfrm>
+          <a:prstGeom prst="rect">
+            <a:avLst/>
+          </a:prstGeom>
+        </p:spPr>
+      </p:pic>
+      <p:sp>
+        <p:nvSpPr>
+          <p:cNvPr id="10" name="TextovéPole 9">
+            <a:extLst>
+              <a:ext uri="{FF2B5EF4-FFF2-40B4-BE49-F238E27FC236}">
+                <a16:creationId xmlns:a16="http://schemas.microsoft.com/office/drawing/2014/main" id="{C9E22EA4-C22F-287F-CAD5-0CBFDE927B15}"/>
+              </a:ext>
+            </a:extLst>
+          </p:cNvPr>
+          <p:cNvSpPr txBox="1"/>
+          <p:nvPr/>
+        </p:nvSpPr>
+        <p:spPr>
+          <a:xfrm>
+            <a:off x="659786" y="1612077"/>
+            <a:ext cx="6950978" cy="523220"/>
+          </a:xfrm>
+          <a:prstGeom prst="rect">
+            <a:avLst/>
+          </a:prstGeom>
+          <a:noFill/>
+        </p:spPr>
+        <p:txBody>
+          <a:bodyPr wrap="square" rtlCol="0">
+            <a:spAutoFit/>
+          </a:bodyPr>
+          <a:lstStyle/>
+          <a:p>
+            <a:r>
+              <a:rPr lang="en-GB" sz="2800" b="1" i="0" dirty="0" err="1">
+                <a:solidFill>
+                  <a:srgbClr val="030712"/>
+                </a:solidFill>
+                <a:effectLst/>
+                <a:latin typeface="ui-sans-serif"/>
+              </a:rPr>
+              <a:t>Rychlost</a:t>
+            </a:r>
+            <a:r>
+              <a:rPr lang="en-GB" sz="2800" b="1" i="0" dirty="0">
+                <a:solidFill>
+                  <a:srgbClr val="030712"/>
+                </a:solidFill>
+                <a:effectLst/>
+                <a:latin typeface="ui-sans-serif"/>
+              </a:rPr>
+              <a:t> </a:t>
+            </a:r>
+            <a:r>
+              <a:rPr lang="en-GB" sz="2800" b="1" i="0" dirty="0" err="1">
+                <a:solidFill>
+                  <a:srgbClr val="030712"/>
+                </a:solidFill>
+                <a:effectLst/>
+                <a:latin typeface="ui-sans-serif"/>
+              </a:rPr>
+              <a:t>přenosu</a:t>
+            </a:r>
+            <a:r>
+              <a:rPr lang="en-GB" sz="2800" b="1" i="0" dirty="0">
+                <a:solidFill>
+                  <a:srgbClr val="030712"/>
+                </a:solidFill>
+                <a:effectLst/>
+                <a:latin typeface="ui-sans-serif"/>
+              </a:rPr>
+              <a:t> </a:t>
+            </a:r>
+            <a:r>
+              <a:rPr lang="en-GB" sz="2800" b="1" i="0" dirty="0" err="1">
+                <a:solidFill>
+                  <a:srgbClr val="030712"/>
+                </a:solidFill>
+                <a:effectLst/>
+                <a:latin typeface="ui-sans-serif"/>
+              </a:rPr>
+              <a:t>podle</a:t>
+            </a:r>
+            <a:r>
+              <a:rPr lang="en-GB" sz="2800" b="1" i="0" dirty="0">
+                <a:solidFill>
+                  <a:srgbClr val="030712"/>
+                </a:solidFill>
+                <a:effectLst/>
+                <a:latin typeface="ui-sans-serif"/>
+              </a:rPr>
+              <a:t> </a:t>
+            </a:r>
+            <a:r>
+              <a:rPr lang="en-GB" sz="2800" b="1" i="0" dirty="0" err="1">
+                <a:solidFill>
+                  <a:srgbClr val="030712"/>
+                </a:solidFill>
+                <a:effectLst/>
+                <a:latin typeface="ui-sans-serif"/>
+              </a:rPr>
+              <a:t>velikosti</a:t>
+            </a:r>
+            <a:r>
+              <a:rPr lang="en-GB" sz="2800" b="1" i="0" dirty="0">
+                <a:solidFill>
+                  <a:srgbClr val="030712"/>
+                </a:solidFill>
+                <a:effectLst/>
+                <a:latin typeface="ui-sans-serif"/>
+              </a:rPr>
+              <a:t> </a:t>
+            </a:r>
+            <a:r>
+              <a:rPr lang="en-GB" sz="2800" b="1" i="0" dirty="0" err="1">
+                <a:solidFill>
+                  <a:srgbClr val="030712"/>
+                </a:solidFill>
+                <a:effectLst/>
+                <a:latin typeface="ui-sans-serif"/>
+              </a:rPr>
+              <a:t>souboru</a:t>
+            </a:r>
+            <a:endParaRPr lang="en-GB" sz="2800" b="1" dirty="0"/>
+          </a:p>
+        </p:txBody>
+      </p:sp>
     </p:spTree>
     <p:extLst>
       <p:ext uri="{BB962C8B-B14F-4D97-AF65-F5344CB8AC3E}">
-        <p14:creationId xmlns:p14="http://schemas.microsoft.com/office/powerpoint/2010/main" val="3529689052"/>
+        <p14:creationId xmlns:p14="http://schemas.microsoft.com/office/powerpoint/2010/main" val="4041539144"/>
       </p:ext>
     </p:extLst>
   </p:cSld>
@@ -11421,7 +11818,13 @@
   <p:cSld>
     <p:spTree>
       <p:nvGrpSpPr>
-        <p:cNvPr id="1" name=""/>
+        <p:cNvPr id="1" name="">
+          <a:extLst>
+            <a:ext uri="{FF2B5EF4-FFF2-40B4-BE49-F238E27FC236}">
+              <a16:creationId xmlns:a16="http://schemas.microsoft.com/office/drawing/2014/main" id="{29BB4504-5457-1463-5149-903402E74F92}"/>
+            </a:ext>
+          </a:extLst>
+        </p:cNvPr>
         <p:cNvGrpSpPr/>
         <p:nvPr/>
       </p:nvGrpSpPr>
@@ -11435,10 +11838,39 @@
       </p:grpSpPr>
       <p:sp>
         <p:nvSpPr>
+          <p:cNvPr id="5" name="Zástupný symbol pro číslo snímku 4">
+            <a:extLst>
+              <a:ext uri="{FF2B5EF4-FFF2-40B4-BE49-F238E27FC236}">
+                <a16:creationId xmlns:a16="http://schemas.microsoft.com/office/drawing/2014/main" id="{796AE311-FBC2-505E-6188-EE4F3414063E}"/>
+              </a:ext>
+            </a:extLst>
+          </p:cNvPr>
+          <p:cNvSpPr>
+            <a:spLocks noGrp="1"/>
+          </p:cNvSpPr>
+          <p:nvPr>
+            <p:ph type="sldNum" sz="quarter" idx="12"/>
+          </p:nvPr>
+        </p:nvSpPr>
+        <p:spPr/>
+        <p:txBody>
+          <a:bodyPr/>
+          <a:lstStyle/>
+          <a:p>
+            <a:fld id="{2396986B-09E1-422F-9D6D-F3432B0D2D09}" type="slidenum">
+              <a:rPr lang="en-GB" smtClean="0"/>
+              <a:t>23</a:t>
+            </a:fld>
+            <a:endParaRPr lang="en-GB"/>
+          </a:p>
+        </p:txBody>
+      </p:sp>
+      <p:sp>
+        <p:nvSpPr>
           <p:cNvPr id="6" name="Obdélník 5">
             <a:extLst>
               <a:ext uri="{FF2B5EF4-FFF2-40B4-BE49-F238E27FC236}">
-                <a16:creationId xmlns:a16="http://schemas.microsoft.com/office/drawing/2014/main" id="{9AB1E2E0-E445-7609-3BC3-2408D765191C}"/>
+                <a16:creationId xmlns:a16="http://schemas.microsoft.com/office/drawing/2014/main" id="{2EB3FCC7-3D36-2684-F855-D227E243308F}"/>
               </a:ext>
             </a:extLst>
           </p:cNvPr>
@@ -11481,16 +11913,16 @@
           <a:lstStyle/>
           <a:p>
             <a:pPr algn="ctr"/>
-            <a:endParaRPr lang="en-GB"/>
-          </a:p>
-        </p:txBody>
-      </p:sp>
-      <p:sp>
-        <p:nvSpPr>
-          <p:cNvPr id="2" name="Nadpis 1">
-            <a:extLst>
-              <a:ext uri="{FF2B5EF4-FFF2-40B4-BE49-F238E27FC236}">
-                <a16:creationId xmlns:a16="http://schemas.microsoft.com/office/drawing/2014/main" id="{E85E28AF-D31F-9986-04D8-696B845F2560}"/>
+            <a:endParaRPr lang="en-GB" dirty="0"/>
+          </a:p>
+        </p:txBody>
+      </p:sp>
+      <p:sp>
+        <p:nvSpPr>
+          <p:cNvPr id="7" name="Nadpis 1">
+            <a:extLst>
+              <a:ext uri="{FF2B5EF4-FFF2-40B4-BE49-F238E27FC236}">
+                <a16:creationId xmlns:a16="http://schemas.microsoft.com/office/drawing/2014/main" id="{6C6303FB-B554-9572-DBBC-98BDE67DCB19}"/>
               </a:ext>
             </a:extLst>
           </p:cNvPr>
@@ -11503,7 +11935,7 @@
         </p:nvSpPr>
         <p:spPr>
           <a:xfrm>
-            <a:off x="0" y="-11363"/>
+            <a:off x="0" y="0"/>
             <a:ext cx="10515600" cy="1325563"/>
           </a:xfrm>
         </p:spPr>
@@ -11512,20 +11944,12 @@
           <a:lstStyle/>
           <a:p>
             <a:r>
-              <a:rPr lang="cs-CZ" dirty="0" err="1">
+              <a:rPr lang="cs-CZ" dirty="0">
                 <a:solidFill>
                   <a:srgbClr val="FF0000"/>
                 </a:solidFill>
               </a:rPr>
-              <a:t>Ukazka</a:t>
-            </a:r>
-            <a:r>
-              <a:rPr lang="cs-CZ" dirty="0">
-                <a:solidFill>
-                  <a:srgbClr val="FF0000"/>
-                </a:solidFill>
-              </a:rPr>
-              <a:t> Aplikace</a:t>
+              <a:t>Doporučení na základě testování</a:t>
             </a:r>
             <a:endParaRPr lang="en-GB" dirty="0">
               <a:solidFill>
@@ -11535,74 +11959,12 @@
           </a:p>
         </p:txBody>
       </p:sp>
-      <p:sp>
-        <p:nvSpPr>
-          <p:cNvPr id="3" name="Zástupný obsah 2">
-            <a:extLst>
-              <a:ext uri="{FF2B5EF4-FFF2-40B4-BE49-F238E27FC236}">
-                <a16:creationId xmlns:a16="http://schemas.microsoft.com/office/drawing/2014/main" id="{D0CB7290-F736-14F9-C8FD-B9CDA15801A9}"/>
-              </a:ext>
-            </a:extLst>
-          </p:cNvPr>
-          <p:cNvSpPr>
-            <a:spLocks noGrp="1"/>
-          </p:cNvSpPr>
-          <p:nvPr>
-            <p:ph sz="half" idx="1"/>
-          </p:nvPr>
-        </p:nvSpPr>
-        <p:spPr>
-          <a:xfrm>
-            <a:off x="372324" y="1690688"/>
-            <a:ext cx="11447352" cy="4351338"/>
-          </a:xfrm>
-        </p:spPr>
-        <p:txBody>
-          <a:bodyPr/>
-          <a:lstStyle/>
-          <a:p>
-            <a:pPr marL="0" indent="0">
-              <a:buNone/>
-            </a:pPr>
-            <a:endParaRPr lang="cs-CZ" dirty="0"/>
-          </a:p>
-        </p:txBody>
-      </p:sp>
-      <p:sp>
-        <p:nvSpPr>
-          <p:cNvPr id="5" name="Zástupný symbol pro číslo snímku 4">
-            <a:extLst>
-              <a:ext uri="{FF2B5EF4-FFF2-40B4-BE49-F238E27FC236}">
-                <a16:creationId xmlns:a16="http://schemas.microsoft.com/office/drawing/2014/main" id="{A4AF7EF7-19BA-3A65-E16C-250A6BF0B8F4}"/>
-              </a:ext>
-            </a:extLst>
-          </p:cNvPr>
-          <p:cNvSpPr>
-            <a:spLocks noGrp="1"/>
-          </p:cNvSpPr>
-          <p:nvPr>
-            <p:ph type="sldNum" sz="quarter" idx="12"/>
-          </p:nvPr>
-        </p:nvSpPr>
-        <p:spPr/>
-        <p:txBody>
-          <a:bodyPr/>
-          <a:lstStyle/>
-          <a:p>
-            <a:fld id="{2396986B-09E1-422F-9D6D-F3432B0D2D09}" type="slidenum">
-              <a:rPr lang="en-GB" smtClean="0"/>
-              <a:t>23</a:t>
-            </a:fld>
-            <a:endParaRPr lang="en-GB"/>
-          </a:p>
-        </p:txBody>
-      </p:sp>
       <p:pic>
         <p:nvPicPr>
-          <p:cNvPr id="7" name="Obrázek 6">
-            <a:extLst>
-              <a:ext uri="{FF2B5EF4-FFF2-40B4-BE49-F238E27FC236}">
-                <a16:creationId xmlns:a16="http://schemas.microsoft.com/office/drawing/2014/main" id="{42C9C5F8-45A3-7588-5E5A-96B6E799EEAA}"/>
+          <p:cNvPr id="4" name="Obrázek 3">
+            <a:extLst>
+              <a:ext uri="{FF2B5EF4-FFF2-40B4-BE49-F238E27FC236}">
+                <a16:creationId xmlns:a16="http://schemas.microsoft.com/office/drawing/2014/main" id="{B6A6BA83-EB57-899F-D8DD-F0062A3CE0A7}"/>
               </a:ext>
             </a:extLst>
           </p:cNvPr>
@@ -11613,6 +11975,36 @@
         </p:nvPicPr>
         <p:blipFill>
           <a:blip r:embed="rId2"/>
+          <a:stretch>
+            <a:fillRect/>
+          </a:stretch>
+        </p:blipFill>
+        <p:spPr>
+          <a:xfrm>
+            <a:off x="1985962" y="1281112"/>
+            <a:ext cx="8220075" cy="4295775"/>
+          </a:xfrm>
+          <a:prstGeom prst="rect">
+            <a:avLst/>
+          </a:prstGeom>
+        </p:spPr>
+      </p:pic>
+      <p:pic>
+        <p:nvPicPr>
+          <p:cNvPr id="8" name="Obrázek 7">
+            <a:extLst>
+              <a:ext uri="{FF2B5EF4-FFF2-40B4-BE49-F238E27FC236}">
+                <a16:creationId xmlns:a16="http://schemas.microsoft.com/office/drawing/2014/main" id="{58C15B4E-3796-771D-47A8-1F0248B0A66D}"/>
+              </a:ext>
+            </a:extLst>
+          </p:cNvPr>
+          <p:cNvPicPr>
+            <a:picLocks noChangeAspect="1"/>
+          </p:cNvPicPr>
+          <p:nvPr/>
+        </p:nvPicPr>
+        <p:blipFill>
+          <a:blip r:embed="rId3"/>
           <a:stretch>
             <a:fillRect/>
           </a:stretch>
@@ -11629,10 +12021,10 @@
       </p:pic>
       <p:sp>
         <p:nvSpPr>
-          <p:cNvPr id="8" name="Obdélník 7">
-            <a:extLst>
-              <a:ext uri="{FF2B5EF4-FFF2-40B4-BE49-F238E27FC236}">
-                <a16:creationId xmlns:a16="http://schemas.microsoft.com/office/drawing/2014/main" id="{D2798C63-D0C7-8503-BE22-A0C93FE44363}"/>
+          <p:cNvPr id="9" name="Obdélník 8">
+            <a:extLst>
+              <a:ext uri="{FF2B5EF4-FFF2-40B4-BE49-F238E27FC236}">
+                <a16:creationId xmlns:a16="http://schemas.microsoft.com/office/drawing/2014/main" id="{4DC50664-6B0E-858D-A60C-3FDB2FAD98CE}"/>
               </a:ext>
             </a:extLst>
           </p:cNvPr>
@@ -11682,6 +12074,282 @@
     </p:spTree>
     <p:extLst>
       <p:ext uri="{BB962C8B-B14F-4D97-AF65-F5344CB8AC3E}">
+        <p14:creationId xmlns:p14="http://schemas.microsoft.com/office/powerpoint/2010/main" val="3529689052"/>
+      </p:ext>
+    </p:extLst>
+  </p:cSld>
+  <p:clrMapOvr>
+    <a:masterClrMapping/>
+  </p:clrMapOvr>
+</p:sld>
+</file>
+
+<file path=ppt/slides/slide24.xml><?xml version="1.0" encoding="utf-8"?>
+<p:sld xmlns:a="http://schemas.openxmlformats.org/drawingml/2006/main" xmlns:r="http://schemas.openxmlformats.org/officeDocument/2006/relationships" xmlns:p="http://schemas.openxmlformats.org/presentationml/2006/main">
+  <p:cSld>
+    <p:spTree>
+      <p:nvGrpSpPr>
+        <p:cNvPr id="1" name=""/>
+        <p:cNvGrpSpPr/>
+        <p:nvPr/>
+      </p:nvGrpSpPr>
+      <p:grpSpPr>
+        <a:xfrm>
+          <a:off x="0" y="0"/>
+          <a:ext cx="0" cy="0"/>
+          <a:chOff x="0" y="0"/>
+          <a:chExt cx="0" cy="0"/>
+        </a:xfrm>
+      </p:grpSpPr>
+      <p:sp>
+        <p:nvSpPr>
+          <p:cNvPr id="6" name="Obdélník 5">
+            <a:extLst>
+              <a:ext uri="{FF2B5EF4-FFF2-40B4-BE49-F238E27FC236}">
+                <a16:creationId xmlns:a16="http://schemas.microsoft.com/office/drawing/2014/main" id="{9AB1E2E0-E445-7609-3BC3-2408D765191C}"/>
+              </a:ext>
+            </a:extLst>
+          </p:cNvPr>
+          <p:cNvSpPr/>
+          <p:nvPr/>
+        </p:nvSpPr>
+        <p:spPr>
+          <a:xfrm>
+            <a:off x="0" y="-1"/>
+            <a:ext cx="12192000" cy="1116703"/>
+          </a:xfrm>
+          <a:prstGeom prst="rect">
+            <a:avLst/>
+          </a:prstGeom>
+          <a:solidFill>
+            <a:schemeClr val="bg2"/>
+          </a:solidFill>
+          <a:ln>
+            <a:noFill/>
+          </a:ln>
+        </p:spPr>
+        <p:style>
+          <a:lnRef idx="2">
+            <a:schemeClr val="accent1">
+              <a:shade val="15000"/>
+            </a:schemeClr>
+          </a:lnRef>
+          <a:fillRef idx="1">
+            <a:schemeClr val="accent1"/>
+          </a:fillRef>
+          <a:effectRef idx="0">
+            <a:schemeClr val="accent1"/>
+          </a:effectRef>
+          <a:fontRef idx="minor">
+            <a:schemeClr val="lt1"/>
+          </a:fontRef>
+        </p:style>
+        <p:txBody>
+          <a:bodyPr rtlCol="0" anchor="ctr"/>
+          <a:lstStyle/>
+          <a:p>
+            <a:pPr algn="ctr"/>
+            <a:endParaRPr lang="en-GB"/>
+          </a:p>
+        </p:txBody>
+      </p:sp>
+      <p:sp>
+        <p:nvSpPr>
+          <p:cNvPr id="2" name="Nadpis 1">
+            <a:extLst>
+              <a:ext uri="{FF2B5EF4-FFF2-40B4-BE49-F238E27FC236}">
+                <a16:creationId xmlns:a16="http://schemas.microsoft.com/office/drawing/2014/main" id="{E85E28AF-D31F-9986-04D8-696B845F2560}"/>
+              </a:ext>
+            </a:extLst>
+          </p:cNvPr>
+          <p:cNvSpPr>
+            <a:spLocks noGrp="1"/>
+          </p:cNvSpPr>
+          <p:nvPr>
+            <p:ph type="title"/>
+          </p:nvPr>
+        </p:nvSpPr>
+        <p:spPr>
+          <a:xfrm>
+            <a:off x="0" y="-11363"/>
+            <a:ext cx="10515600" cy="1325563"/>
+          </a:xfrm>
+        </p:spPr>
+        <p:txBody>
+          <a:bodyPr/>
+          <a:lstStyle/>
+          <a:p>
+            <a:r>
+              <a:rPr lang="cs-CZ" dirty="0" err="1">
+                <a:solidFill>
+                  <a:srgbClr val="FF0000"/>
+                </a:solidFill>
+              </a:rPr>
+              <a:t>Ukazka</a:t>
+            </a:r>
+            <a:r>
+              <a:rPr lang="cs-CZ" dirty="0">
+                <a:solidFill>
+                  <a:srgbClr val="FF0000"/>
+                </a:solidFill>
+              </a:rPr>
+              <a:t> Aplikace</a:t>
+            </a:r>
+            <a:endParaRPr lang="en-GB" dirty="0">
+              <a:solidFill>
+                <a:srgbClr val="FF0000"/>
+              </a:solidFill>
+            </a:endParaRPr>
+          </a:p>
+        </p:txBody>
+      </p:sp>
+      <p:sp>
+        <p:nvSpPr>
+          <p:cNvPr id="3" name="Zástupný obsah 2">
+            <a:extLst>
+              <a:ext uri="{FF2B5EF4-FFF2-40B4-BE49-F238E27FC236}">
+                <a16:creationId xmlns:a16="http://schemas.microsoft.com/office/drawing/2014/main" id="{D0CB7290-F736-14F9-C8FD-B9CDA15801A9}"/>
+              </a:ext>
+            </a:extLst>
+          </p:cNvPr>
+          <p:cNvSpPr>
+            <a:spLocks noGrp="1"/>
+          </p:cNvSpPr>
+          <p:nvPr>
+            <p:ph sz="half" idx="1"/>
+          </p:nvPr>
+        </p:nvSpPr>
+        <p:spPr>
+          <a:xfrm>
+            <a:off x="372324" y="1690688"/>
+            <a:ext cx="11447352" cy="4351338"/>
+          </a:xfrm>
+        </p:spPr>
+        <p:txBody>
+          <a:bodyPr/>
+          <a:lstStyle/>
+          <a:p>
+            <a:pPr marL="0" indent="0">
+              <a:buNone/>
+            </a:pPr>
+            <a:endParaRPr lang="cs-CZ" dirty="0"/>
+          </a:p>
+        </p:txBody>
+      </p:sp>
+      <p:sp>
+        <p:nvSpPr>
+          <p:cNvPr id="5" name="Zástupný symbol pro číslo snímku 4">
+            <a:extLst>
+              <a:ext uri="{FF2B5EF4-FFF2-40B4-BE49-F238E27FC236}">
+                <a16:creationId xmlns:a16="http://schemas.microsoft.com/office/drawing/2014/main" id="{A4AF7EF7-19BA-3A65-E16C-250A6BF0B8F4}"/>
+              </a:ext>
+            </a:extLst>
+          </p:cNvPr>
+          <p:cNvSpPr>
+            <a:spLocks noGrp="1"/>
+          </p:cNvSpPr>
+          <p:nvPr>
+            <p:ph type="sldNum" sz="quarter" idx="12"/>
+          </p:nvPr>
+        </p:nvSpPr>
+        <p:spPr/>
+        <p:txBody>
+          <a:bodyPr/>
+          <a:lstStyle/>
+          <a:p>
+            <a:fld id="{2396986B-09E1-422F-9D6D-F3432B0D2D09}" type="slidenum">
+              <a:rPr lang="en-GB" smtClean="0"/>
+              <a:t>24</a:t>
+            </a:fld>
+            <a:endParaRPr lang="en-GB"/>
+          </a:p>
+        </p:txBody>
+      </p:sp>
+      <p:pic>
+        <p:nvPicPr>
+          <p:cNvPr id="7" name="Obrázek 6">
+            <a:extLst>
+              <a:ext uri="{FF2B5EF4-FFF2-40B4-BE49-F238E27FC236}">
+                <a16:creationId xmlns:a16="http://schemas.microsoft.com/office/drawing/2014/main" id="{42C9C5F8-45A3-7588-5E5A-96B6E799EEAA}"/>
+              </a:ext>
+            </a:extLst>
+          </p:cNvPr>
+          <p:cNvPicPr>
+            <a:picLocks noChangeAspect="1"/>
+          </p:cNvPicPr>
+          <p:nvPr/>
+        </p:nvPicPr>
+        <p:blipFill>
+          <a:blip r:embed="rId2"/>
+          <a:stretch>
+            <a:fillRect/>
+          </a:stretch>
+        </p:blipFill>
+        <p:spPr>
+          <a:xfrm>
+            <a:off x="10113527" y="299406"/>
+            <a:ext cx="1556365" cy="493482"/>
+          </a:xfrm>
+          <a:prstGeom prst="rect">
+            <a:avLst/>
+          </a:prstGeom>
+        </p:spPr>
+      </p:pic>
+      <p:sp>
+        <p:nvSpPr>
+          <p:cNvPr id="8" name="Obdélník 7">
+            <a:extLst>
+              <a:ext uri="{FF2B5EF4-FFF2-40B4-BE49-F238E27FC236}">
+                <a16:creationId xmlns:a16="http://schemas.microsoft.com/office/drawing/2014/main" id="{D2798C63-D0C7-8503-BE22-A0C93FE44363}"/>
+              </a:ext>
+            </a:extLst>
+          </p:cNvPr>
+          <p:cNvSpPr/>
+          <p:nvPr/>
+        </p:nvSpPr>
+        <p:spPr>
+          <a:xfrm>
+            <a:off x="-1349" y="1070983"/>
+            <a:ext cx="860453" cy="45719"/>
+          </a:xfrm>
+          <a:prstGeom prst="rect">
+            <a:avLst/>
+          </a:prstGeom>
+          <a:solidFill>
+            <a:srgbClr val="FF0000"/>
+          </a:solidFill>
+          <a:ln>
+            <a:noFill/>
+          </a:ln>
+        </p:spPr>
+        <p:style>
+          <a:lnRef idx="2">
+            <a:schemeClr val="accent1">
+              <a:shade val="15000"/>
+            </a:schemeClr>
+          </a:lnRef>
+          <a:fillRef idx="1">
+            <a:schemeClr val="accent1"/>
+          </a:fillRef>
+          <a:effectRef idx="0">
+            <a:schemeClr val="accent1"/>
+          </a:effectRef>
+          <a:fontRef idx="minor">
+            <a:schemeClr val="lt1"/>
+          </a:fontRef>
+        </p:style>
+        <p:txBody>
+          <a:bodyPr rtlCol="0" anchor="ctr"/>
+          <a:lstStyle/>
+          <a:p>
+            <a:pPr algn="ctr"/>
+            <a:endParaRPr lang="en-GB"/>
+          </a:p>
+        </p:txBody>
+      </p:sp>
+    </p:spTree>
+    <p:extLst>
+      <p:ext uri="{BB962C8B-B14F-4D97-AF65-F5344CB8AC3E}">
         <p14:creationId xmlns:p14="http://schemas.microsoft.com/office/powerpoint/2010/main" val="943163058"/>
       </p:ext>
     </p:extLst>
@@ -11692,7 +12360,7 @@
 </p:sld>
 </file>
 
-<file path=ppt/slides/slide24.xml><?xml version="1.0" encoding="utf-8"?>
+<file path=ppt/slides/slide25.xml><?xml version="1.0" encoding="utf-8"?>
 <p:sld xmlns:a="http://schemas.openxmlformats.org/drawingml/2006/main" xmlns:r="http://schemas.openxmlformats.org/officeDocument/2006/relationships" xmlns:p="http://schemas.openxmlformats.org/presentationml/2006/main">
   <p:cSld>
     <p:spTree>
@@ -11822,7 +12490,7 @@
           <a:p>
             <a:fld id="{2396986B-09E1-422F-9D6D-F3432B0D2D09}" type="slidenum">
               <a:rPr lang="en-GB" smtClean="0"/>
-              <a:t>24</a:t>
+              <a:t>25</a:t>
             </a:fld>
             <a:endParaRPr lang="en-GB"/>
           </a:p>

</xml_diff>

<commit_message>
Upraveny chybky + zavěr testovaní
</commit_message>
<xml_diff>
--- a/docs/p2ppost_prezentace.pptx
+++ b/docs/p2ppost_prezentace.pptx
@@ -5,7 +5,7 @@
     <p:sldMasterId id="2147483672" r:id="rId1"/>
   </p:sldMasterIdLst>
   <p:notesMasterIdLst>
-    <p:notesMasterId r:id="rId24"/>
+    <p:notesMasterId r:id="rId25"/>
   </p:notesMasterIdLst>
   <p:sldIdLst>
     <p:sldId id="256" r:id="rId2"/>
@@ -28,8 +28,9 @@
     <p:sldId id="286" r:id="rId19"/>
     <p:sldId id="288" r:id="rId20"/>
     <p:sldId id="287" r:id="rId21"/>
-    <p:sldId id="280" r:id="rId22"/>
-    <p:sldId id="282" r:id="rId23"/>
+    <p:sldId id="289" r:id="rId22"/>
+    <p:sldId id="280" r:id="rId23"/>
+    <p:sldId id="282" r:id="rId24"/>
   </p:sldIdLst>
   <p:sldSz cx="12192000" cy="6858000"/>
   <p:notesSz cx="6858000" cy="9144000"/>
@@ -218,7 +219,7 @@
           <a:p>
             <a:fld id="{DD2E46A2-F158-4BED-A71D-F36B4700C14A}" type="datetimeFigureOut">
               <a:rPr lang="en-GB" smtClean="0"/>
-              <a:t>26/04/2025</a:t>
+              <a:t>29/04/2025</a:t>
             </a:fld>
             <a:endParaRPr lang="en-GB"/>
           </a:p>
@@ -635,7 +636,7 @@
           <a:p>
             <a:fld id="{CFBB353D-A9CC-4A50-AEB6-42341B31158E}" type="datetime1">
               <a:rPr lang="en-GB" smtClean="0"/>
-              <a:t>26/04/2025</a:t>
+              <a:t>29/04/2025</a:t>
             </a:fld>
             <a:endParaRPr lang="en-GB"/>
           </a:p>
@@ -835,7 +836,7 @@
           <a:p>
             <a:fld id="{EB96EF39-887F-41D7-8E72-6B975371605A}" type="datetime1">
               <a:rPr lang="en-GB" smtClean="0"/>
-              <a:t>26/04/2025</a:t>
+              <a:t>29/04/2025</a:t>
             </a:fld>
             <a:endParaRPr lang="en-GB"/>
           </a:p>
@@ -1045,7 +1046,7 @@
           <a:p>
             <a:fld id="{067D2E50-B61F-4B9C-A2ED-B350683F3156}" type="datetime1">
               <a:rPr lang="en-GB" smtClean="0"/>
-              <a:t>26/04/2025</a:t>
+              <a:t>29/04/2025</a:t>
             </a:fld>
             <a:endParaRPr lang="en-GB"/>
           </a:p>
@@ -1245,7 +1246,7 @@
           <a:p>
             <a:fld id="{DFD24230-BB46-4A99-92E0-5F7BD4039F61}" type="datetime1">
               <a:rPr lang="en-GB" smtClean="0"/>
-              <a:t>26/04/2025</a:t>
+              <a:t>29/04/2025</a:t>
             </a:fld>
             <a:endParaRPr lang="en-GB"/>
           </a:p>
@@ -1521,7 +1522,7 @@
           <a:p>
             <a:fld id="{8540C167-9577-4083-BD6E-9376B6373118}" type="datetime1">
               <a:rPr lang="en-GB" smtClean="0"/>
-              <a:t>26/04/2025</a:t>
+              <a:t>29/04/2025</a:t>
             </a:fld>
             <a:endParaRPr lang="en-GB"/>
           </a:p>
@@ -1789,7 +1790,7 @@
           <a:p>
             <a:fld id="{2EE73FD0-6BC8-4D2A-943F-1CE580F74102}" type="datetime1">
               <a:rPr lang="en-GB" smtClean="0"/>
-              <a:t>26/04/2025</a:t>
+              <a:t>29/04/2025</a:t>
             </a:fld>
             <a:endParaRPr lang="en-GB"/>
           </a:p>
@@ -2204,7 +2205,7 @@
           <a:p>
             <a:fld id="{5F74465D-695A-43BB-A2E4-5D251AF1F3FB}" type="datetime1">
               <a:rPr lang="en-GB" smtClean="0"/>
-              <a:t>26/04/2025</a:t>
+              <a:t>29/04/2025</a:t>
             </a:fld>
             <a:endParaRPr lang="en-GB"/>
           </a:p>
@@ -2346,7 +2347,7 @@
           <a:p>
             <a:fld id="{88357162-6A14-4212-A0A4-5C19A1008B56}" type="datetime1">
               <a:rPr lang="en-GB" smtClean="0"/>
-              <a:t>26/04/2025</a:t>
+              <a:t>29/04/2025</a:t>
             </a:fld>
             <a:endParaRPr lang="en-GB"/>
           </a:p>
@@ -2459,7 +2460,7 @@
           <a:p>
             <a:fld id="{460961C2-EC52-4AA6-8B9A-E569488EF0AE}" type="datetime1">
               <a:rPr lang="en-GB" smtClean="0"/>
-              <a:t>26/04/2025</a:t>
+              <a:t>29/04/2025</a:t>
             </a:fld>
             <a:endParaRPr lang="en-GB"/>
           </a:p>
@@ -2772,7 +2773,7 @@
           <a:p>
             <a:fld id="{65D047CA-679E-4D26-97BE-4B49DD2A0BD5}" type="datetime1">
               <a:rPr lang="en-GB" smtClean="0"/>
-              <a:t>26/04/2025</a:t>
+              <a:t>29/04/2025</a:t>
             </a:fld>
             <a:endParaRPr lang="en-GB"/>
           </a:p>
@@ -3061,7 +3062,7 @@
           <a:p>
             <a:fld id="{5F7E52EE-56F2-41D1-BEFA-1CD00EAC2057}" type="datetime1">
               <a:rPr lang="en-GB" smtClean="0"/>
-              <a:t>26/04/2025</a:t>
+              <a:t>29/04/2025</a:t>
             </a:fld>
             <a:endParaRPr lang="en-GB"/>
           </a:p>
@@ -3304,7 +3305,7 @@
           <a:p>
             <a:fld id="{0C33FE3F-F1C9-475B-A681-8D66ED612CC1}" type="datetime1">
               <a:rPr lang="en-GB" smtClean="0"/>
-              <a:t>26/04/2025</a:t>
+              <a:t>29/04/2025</a:t>
             </a:fld>
             <a:endParaRPr lang="en-GB"/>
           </a:p>
@@ -6587,7 +6588,6 @@
                   <a:srgbClr val="030712"/>
                 </a:solidFill>
                 <a:effectLst/>
-                <a:latin typeface="ui-sans-serif"/>
               </a:rPr>
               <a:t>Dva</a:t>
             </a:r>
@@ -6597,7 +6597,6 @@
                   <a:srgbClr val="030712"/>
                 </a:solidFill>
                 <a:effectLst/>
-                <a:latin typeface="ui-sans-serif"/>
               </a:rPr>
               <a:t> </a:t>
             </a:r>
@@ -6607,7 +6606,6 @@
                   <a:srgbClr val="030712"/>
                 </a:solidFill>
                 <a:effectLst/>
-                <a:latin typeface="ui-sans-serif"/>
               </a:rPr>
               <a:t>základní</a:t>
             </a:r>
@@ -6617,7 +6615,6 @@
                   <a:srgbClr val="030712"/>
                 </a:solidFill>
                 <a:effectLst/>
-                <a:latin typeface="ui-sans-serif"/>
               </a:rPr>
               <a:t> </a:t>
             </a:r>
@@ -6627,7 +6624,6 @@
                   <a:srgbClr val="030712"/>
                 </a:solidFill>
                 <a:effectLst/>
-                <a:latin typeface="ui-sans-serif"/>
               </a:rPr>
               <a:t>přístupy</a:t>
             </a:r>
@@ -6637,7 +6633,6 @@
                   <a:srgbClr val="030712"/>
                 </a:solidFill>
                 <a:effectLst/>
-                <a:latin typeface="ui-sans-serif"/>
               </a:rPr>
               <a:t> k </a:t>
             </a:r>
@@ -6647,7 +6642,6 @@
                   <a:srgbClr val="030712"/>
                 </a:solidFill>
                 <a:effectLst/>
-                <a:latin typeface="ui-sans-serif"/>
               </a:rPr>
               <a:t>testování</a:t>
             </a:r>
@@ -6657,7 +6651,6 @@
                   <a:srgbClr val="030712"/>
                 </a:solidFill>
                 <a:effectLst/>
-                <a:latin typeface="ui-sans-serif"/>
               </a:rPr>
               <a:t>:</a:t>
             </a:r>
@@ -6675,7 +6668,6 @@
                   <a:srgbClr val="030712"/>
                 </a:solidFill>
                 <a:effectLst/>
-                <a:latin typeface="ui-sans-serif"/>
               </a:rPr>
               <a:t>1. Manuální </a:t>
             </a:r>
@@ -6685,7 +6677,6 @@
                   <a:srgbClr val="030712"/>
                 </a:solidFill>
                 <a:effectLst/>
-                <a:latin typeface="ui-sans-serif"/>
               </a:rPr>
               <a:t>testování</a:t>
             </a:r>
@@ -6695,7 +6686,6 @@
                   <a:srgbClr val="030712"/>
                 </a:solidFill>
                 <a:effectLst/>
-                <a:latin typeface="ui-sans-serif"/>
               </a:rPr>
               <a:t> UI a </a:t>
             </a:r>
@@ -6705,7 +6695,6 @@
                   <a:srgbClr val="030712"/>
                 </a:solidFill>
                 <a:effectLst/>
-                <a:latin typeface="ui-sans-serif"/>
               </a:rPr>
               <a:t>funkčnosti</a:t>
             </a:r>
@@ -6714,7 +6703,6 @@
                 <a:srgbClr val="030712"/>
               </a:solidFill>
               <a:effectLst/>
-              <a:latin typeface="ui-sans-serif"/>
             </a:endParaRPr>
           </a:p>
           <a:p>
@@ -6729,7 +6717,6 @@
                   <a:srgbClr val="030712"/>
                 </a:solidFill>
                 <a:effectLst/>
-                <a:latin typeface="ui-sans-serif"/>
               </a:rPr>
               <a:t>Testování</a:t>
             </a:r>
@@ -6739,7 +6726,6 @@
                   <a:srgbClr val="030712"/>
                 </a:solidFill>
                 <a:effectLst/>
-                <a:latin typeface="ui-sans-serif"/>
               </a:rPr>
               <a:t> </a:t>
             </a:r>
@@ -6749,7 +6735,6 @@
                   <a:srgbClr val="030712"/>
                 </a:solidFill>
                 <a:effectLst/>
-                <a:latin typeface="ui-sans-serif"/>
               </a:rPr>
               <a:t>uživatelského</a:t>
             </a:r>
@@ -6759,7 +6744,6 @@
                   <a:srgbClr val="030712"/>
                 </a:solidFill>
                 <a:effectLst/>
-                <a:latin typeface="ui-sans-serif"/>
               </a:rPr>
               <a:t> </a:t>
             </a:r>
@@ -6769,7 +6753,6 @@
                   <a:srgbClr val="030712"/>
                 </a:solidFill>
                 <a:effectLst/>
-                <a:latin typeface="ui-sans-serif"/>
               </a:rPr>
               <a:t>rozhraní</a:t>
             </a:r>
@@ -6778,7 +6761,6 @@
                 <a:srgbClr val="030712"/>
               </a:solidFill>
               <a:effectLst/>
-              <a:latin typeface="ui-sans-serif"/>
             </a:endParaRPr>
           </a:p>
           <a:p>
@@ -6793,7 +6775,6 @@
                   <a:srgbClr val="030712"/>
                 </a:solidFill>
                 <a:effectLst/>
-                <a:latin typeface="ui-sans-serif"/>
               </a:rPr>
               <a:t>Ověření</a:t>
             </a:r>
@@ -6803,7 +6784,6 @@
                   <a:srgbClr val="030712"/>
                 </a:solidFill>
                 <a:effectLst/>
-                <a:latin typeface="ui-sans-serif"/>
               </a:rPr>
               <a:t> </a:t>
             </a:r>
@@ -6813,7 +6793,6 @@
                   <a:srgbClr val="030712"/>
                 </a:solidFill>
                 <a:effectLst/>
-                <a:latin typeface="ui-sans-serif"/>
               </a:rPr>
               <a:t>spojení</a:t>
             </a:r>
@@ -6823,7 +6802,6 @@
                   <a:srgbClr val="030712"/>
                 </a:solidFill>
                 <a:effectLst/>
-                <a:latin typeface="ui-sans-serif"/>
               </a:rPr>
               <a:t> </a:t>
             </a:r>
@@ -6833,7 +6811,6 @@
                   <a:srgbClr val="030712"/>
                 </a:solidFill>
                 <a:effectLst/>
-                <a:latin typeface="ui-sans-serif"/>
               </a:rPr>
               <a:t>mezi</a:t>
             </a:r>
@@ -6843,7 +6820,6 @@
                   <a:srgbClr val="030712"/>
                 </a:solidFill>
                 <a:effectLst/>
-                <a:latin typeface="ui-sans-serif"/>
               </a:rPr>
               <a:t> </a:t>
             </a:r>
@@ -6853,7 +6829,6 @@
                   <a:srgbClr val="030712"/>
                 </a:solidFill>
                 <a:effectLst/>
-                <a:latin typeface="ui-sans-serif"/>
               </a:rPr>
               <a:t>stanicemi</a:t>
             </a:r>
@@ -6862,7 +6837,6 @@
                 <a:srgbClr val="030712"/>
               </a:solidFill>
               <a:effectLst/>
-              <a:latin typeface="ui-sans-serif"/>
             </a:endParaRPr>
           </a:p>
           <a:p>
@@ -6877,7 +6851,6 @@
                   <a:srgbClr val="030712"/>
                 </a:solidFill>
                 <a:effectLst/>
-                <a:latin typeface="ui-sans-serif"/>
               </a:rPr>
               <a:t>Výměna</a:t>
             </a:r>
@@ -6887,7 +6860,6 @@
                   <a:srgbClr val="030712"/>
                 </a:solidFill>
                 <a:effectLst/>
-                <a:latin typeface="ui-sans-serif"/>
               </a:rPr>
               <a:t> </a:t>
             </a:r>
@@ -6897,7 +6869,6 @@
                   <a:srgbClr val="030712"/>
                 </a:solidFill>
                 <a:effectLst/>
-                <a:latin typeface="ui-sans-serif"/>
               </a:rPr>
               <a:t>klíčů</a:t>
             </a:r>
@@ -6907,7 +6878,6 @@
                   <a:srgbClr val="030712"/>
                 </a:solidFill>
                 <a:effectLst/>
-                <a:latin typeface="ui-sans-serif"/>
               </a:rPr>
               <a:t> a </a:t>
             </a:r>
@@ -6917,7 +6887,6 @@
                   <a:srgbClr val="030712"/>
                 </a:solidFill>
                 <a:effectLst/>
-                <a:latin typeface="ui-sans-serif"/>
               </a:rPr>
               <a:t>šifrovaná</a:t>
             </a:r>
@@ -6927,7 +6896,6 @@
                   <a:srgbClr val="030712"/>
                 </a:solidFill>
                 <a:effectLst/>
-                <a:latin typeface="ui-sans-serif"/>
               </a:rPr>
               <a:t> </a:t>
             </a:r>
@@ -6937,7 +6905,6 @@
                   <a:srgbClr val="030712"/>
                 </a:solidFill>
                 <a:effectLst/>
-                <a:latin typeface="ui-sans-serif"/>
               </a:rPr>
               <a:t>komunikace</a:t>
             </a:r>
@@ -6946,7 +6913,6 @@
                 <a:srgbClr val="030712"/>
               </a:solidFill>
               <a:effectLst/>
-              <a:latin typeface="ui-sans-serif"/>
             </a:endParaRPr>
           </a:p>
           <a:p>
@@ -6961,7 +6927,6 @@
                   <a:srgbClr val="030712"/>
                 </a:solidFill>
                 <a:effectLst/>
-                <a:latin typeface="ui-sans-serif"/>
               </a:rPr>
               <a:t>Přenos</a:t>
             </a:r>
@@ -6971,7 +6936,6 @@
                   <a:srgbClr val="030712"/>
                 </a:solidFill>
                 <a:effectLst/>
-                <a:latin typeface="ui-sans-serif"/>
               </a:rPr>
               <a:t> </a:t>
             </a:r>
@@ -6981,7 +6945,6 @@
                   <a:srgbClr val="030712"/>
                 </a:solidFill>
                 <a:effectLst/>
-                <a:latin typeface="ui-sans-serif"/>
               </a:rPr>
               <a:t>souborů</a:t>
             </a:r>
@@ -6991,7 +6954,6 @@
                   <a:srgbClr val="030712"/>
                 </a:solidFill>
                 <a:effectLst/>
-                <a:latin typeface="ui-sans-serif"/>
               </a:rPr>
               <a:t> </a:t>
             </a:r>
@@ -7001,7 +6963,6 @@
                   <a:srgbClr val="030712"/>
                 </a:solidFill>
                 <a:effectLst/>
-                <a:latin typeface="ui-sans-serif"/>
               </a:rPr>
               <a:t>různých</a:t>
             </a:r>
@@ -7011,7 +6972,6 @@
                   <a:srgbClr val="030712"/>
                 </a:solidFill>
                 <a:effectLst/>
-                <a:latin typeface="ui-sans-serif"/>
               </a:rPr>
               <a:t> </a:t>
             </a:r>
@@ -7021,7 +6981,6 @@
                   <a:srgbClr val="030712"/>
                 </a:solidFill>
                 <a:effectLst/>
-                <a:latin typeface="ui-sans-serif"/>
               </a:rPr>
               <a:t>velikostí</a:t>
             </a:r>
@@ -7030,7 +6989,6 @@
                 <a:srgbClr val="030712"/>
               </a:solidFill>
               <a:effectLst/>
-              <a:latin typeface="ui-sans-serif"/>
             </a:endParaRPr>
           </a:p>
           <a:p>
@@ -7046,7 +7004,6 @@
                   <a:srgbClr val="030712"/>
                 </a:solidFill>
                 <a:effectLst/>
-                <a:latin typeface="ui-sans-serif"/>
               </a:rPr>
               <a:t>2. </a:t>
             </a:r>
@@ -7056,7 +7013,6 @@
                   <a:srgbClr val="030712"/>
                 </a:solidFill>
                 <a:effectLst/>
-                <a:latin typeface="ui-sans-serif"/>
               </a:rPr>
               <a:t>Automatizované</a:t>
             </a:r>
@@ -7066,7 +7022,6 @@
                   <a:srgbClr val="030712"/>
                 </a:solidFill>
                 <a:effectLst/>
-                <a:latin typeface="ui-sans-serif"/>
               </a:rPr>
               <a:t> </a:t>
             </a:r>
@@ -7076,7 +7031,6 @@
                   <a:srgbClr val="030712"/>
                 </a:solidFill>
                 <a:effectLst/>
-                <a:latin typeface="ui-sans-serif"/>
               </a:rPr>
               <a:t>testování</a:t>
             </a:r>
@@ -7086,7 +7040,6 @@
                   <a:srgbClr val="030712"/>
                 </a:solidFill>
                 <a:effectLst/>
-                <a:latin typeface="ui-sans-serif"/>
               </a:rPr>
               <a:t> </a:t>
             </a:r>
@@ -7096,7 +7049,6 @@
                   <a:srgbClr val="030712"/>
                 </a:solidFill>
                 <a:effectLst/>
-                <a:latin typeface="ui-sans-serif"/>
               </a:rPr>
               <a:t>kombinací</a:t>
             </a:r>
@@ -7106,7 +7058,6 @@
                   <a:srgbClr val="030712"/>
                 </a:solidFill>
                 <a:effectLst/>
-                <a:latin typeface="ui-sans-serif"/>
               </a:rPr>
               <a:t> </a:t>
             </a:r>
@@ -7116,16 +7067,23 @@
                   <a:srgbClr val="030712"/>
                 </a:solidFill>
                 <a:effectLst/>
-                <a:latin typeface="ui-sans-serif"/>
               </a:rPr>
               <a:t>algoritmů</a:t>
+            </a:r>
+            <a:r>
+              <a:rPr lang="cs-CZ" b="0" i="0" dirty="0">
+                <a:solidFill>
+                  <a:srgbClr val="030712"/>
+                </a:solidFill>
+                <a:effectLst/>
+              </a:rPr>
+              <a:t> pomocí skriptu</a:t>
             </a:r>
             <a:endParaRPr lang="en-GB" b="0" i="0" dirty="0">
               <a:solidFill>
                 <a:srgbClr val="030712"/>
               </a:solidFill>
               <a:effectLst/>
-              <a:latin typeface="ui-sans-serif"/>
             </a:endParaRPr>
           </a:p>
           <a:p>
@@ -7140,7 +7098,6 @@
                   <a:srgbClr val="030712"/>
                 </a:solidFill>
                 <a:effectLst/>
-                <a:latin typeface="ui-sans-serif"/>
               </a:rPr>
               <a:t>Testování</a:t>
             </a:r>
@@ -7150,7 +7107,6 @@
                   <a:srgbClr val="030712"/>
                 </a:solidFill>
                 <a:effectLst/>
-                <a:latin typeface="ui-sans-serif"/>
               </a:rPr>
               <a:t> </a:t>
             </a:r>
@@ -7160,7 +7116,6 @@
                   <a:srgbClr val="030712"/>
                 </a:solidFill>
                 <a:effectLst/>
-                <a:latin typeface="ui-sans-serif"/>
               </a:rPr>
               <a:t>všech</a:t>
             </a:r>
@@ -7170,7 +7125,6 @@
                   <a:srgbClr val="030712"/>
                 </a:solidFill>
                 <a:effectLst/>
-                <a:latin typeface="ui-sans-serif"/>
               </a:rPr>
               <a:t> </a:t>
             </a:r>
@@ -7180,7 +7134,6 @@
                   <a:srgbClr val="030712"/>
                 </a:solidFill>
                 <a:effectLst/>
-                <a:latin typeface="ui-sans-serif"/>
               </a:rPr>
               <a:t>kombinací</a:t>
             </a:r>
@@ -7190,7 +7143,6 @@
                   <a:srgbClr val="030712"/>
                 </a:solidFill>
                 <a:effectLst/>
-                <a:latin typeface="ui-sans-serif"/>
               </a:rPr>
               <a:t> </a:t>
             </a:r>
@@ -7200,7 +7152,6 @@
                   <a:srgbClr val="030712"/>
                 </a:solidFill>
                 <a:effectLst/>
-                <a:latin typeface="ui-sans-serif"/>
               </a:rPr>
               <a:t>algoritmů</a:t>
             </a:r>
@@ -7209,7 +7160,6 @@
                 <a:srgbClr val="030712"/>
               </a:solidFill>
               <a:effectLst/>
-              <a:latin typeface="ui-sans-serif"/>
             </a:endParaRPr>
           </a:p>
           <a:p>
@@ -7224,7 +7174,6 @@
                   <a:srgbClr val="030712"/>
                 </a:solidFill>
                 <a:effectLst/>
-                <a:latin typeface="ui-sans-serif"/>
               </a:rPr>
               <a:t>Měření</a:t>
             </a:r>
@@ -7234,7 +7183,6 @@
                   <a:srgbClr val="030712"/>
                 </a:solidFill>
                 <a:effectLst/>
-                <a:latin typeface="ui-sans-serif"/>
               </a:rPr>
               <a:t> </a:t>
             </a:r>
@@ -7244,7 +7192,6 @@
                   <a:srgbClr val="030712"/>
                 </a:solidFill>
                 <a:effectLst/>
-                <a:latin typeface="ui-sans-serif"/>
               </a:rPr>
               <a:t>rychlosti</a:t>
             </a:r>
@@ -7254,7 +7201,6 @@
                   <a:srgbClr val="030712"/>
                 </a:solidFill>
                 <a:effectLst/>
-                <a:latin typeface="ui-sans-serif"/>
               </a:rPr>
               <a:t> </a:t>
             </a:r>
@@ -7264,7 +7210,6 @@
                   <a:srgbClr val="030712"/>
                 </a:solidFill>
                 <a:effectLst/>
-                <a:latin typeface="ui-sans-serif"/>
               </a:rPr>
               <a:t>výměny</a:t>
             </a:r>
@@ -7274,7 +7219,6 @@
                   <a:srgbClr val="030712"/>
                 </a:solidFill>
                 <a:effectLst/>
-                <a:latin typeface="ui-sans-serif"/>
               </a:rPr>
               <a:t> </a:t>
             </a:r>
@@ -7284,7 +7228,6 @@
                   <a:srgbClr val="030712"/>
                 </a:solidFill>
                 <a:effectLst/>
-                <a:latin typeface="ui-sans-serif"/>
               </a:rPr>
               <a:t>klíčů</a:t>
             </a:r>
@@ -7293,7 +7236,6 @@
                 <a:srgbClr val="030712"/>
               </a:solidFill>
               <a:effectLst/>
-              <a:latin typeface="ui-sans-serif"/>
             </a:endParaRPr>
           </a:p>
           <a:p>
@@ -7308,7 +7250,6 @@
                   <a:srgbClr val="030712"/>
                 </a:solidFill>
                 <a:effectLst/>
-                <a:latin typeface="ui-sans-serif"/>
               </a:rPr>
               <a:t>Měření</a:t>
             </a:r>
@@ -7318,7 +7259,6 @@
                   <a:srgbClr val="030712"/>
                 </a:solidFill>
                 <a:effectLst/>
-                <a:latin typeface="ui-sans-serif"/>
               </a:rPr>
               <a:t> </a:t>
             </a:r>
@@ -7328,7 +7268,6 @@
                   <a:srgbClr val="030712"/>
                 </a:solidFill>
                 <a:effectLst/>
-                <a:latin typeface="ui-sans-serif"/>
               </a:rPr>
               <a:t>rychlosti</a:t>
             </a:r>
@@ -7338,7 +7277,6 @@
                   <a:srgbClr val="030712"/>
                 </a:solidFill>
                 <a:effectLst/>
-                <a:latin typeface="ui-sans-serif"/>
               </a:rPr>
               <a:t> </a:t>
             </a:r>
@@ -7348,7 +7286,6 @@
                   <a:srgbClr val="030712"/>
                 </a:solidFill>
                 <a:effectLst/>
-                <a:latin typeface="ui-sans-serif"/>
               </a:rPr>
               <a:t>přenosu</a:t>
             </a:r>
@@ -7358,7 +7295,6 @@
                   <a:srgbClr val="030712"/>
                 </a:solidFill>
                 <a:effectLst/>
-                <a:latin typeface="ui-sans-serif"/>
               </a:rPr>
               <a:t> </a:t>
             </a:r>
@@ -7368,7 +7304,6 @@
                   <a:srgbClr val="030712"/>
                 </a:solidFill>
                 <a:effectLst/>
-                <a:latin typeface="ui-sans-serif"/>
               </a:rPr>
               <a:t>souborů</a:t>
             </a:r>
@@ -7377,7 +7312,6 @@
                 <a:srgbClr val="030712"/>
               </a:solidFill>
               <a:effectLst/>
-              <a:latin typeface="ui-sans-serif"/>
             </a:endParaRPr>
           </a:p>
           <a:p>
@@ -7392,7 +7326,6 @@
                   <a:srgbClr val="030712"/>
                 </a:solidFill>
                 <a:effectLst/>
-                <a:latin typeface="ui-sans-serif"/>
               </a:rPr>
               <a:t>Generování</a:t>
             </a:r>
@@ -7402,7 +7335,6 @@
                   <a:srgbClr val="030712"/>
                 </a:solidFill>
                 <a:effectLst/>
-                <a:latin typeface="ui-sans-serif"/>
               </a:rPr>
               <a:t> </a:t>
             </a:r>
@@ -7412,7 +7344,6 @@
                   <a:srgbClr val="030712"/>
                 </a:solidFill>
                 <a:effectLst/>
-                <a:latin typeface="ui-sans-serif"/>
               </a:rPr>
               <a:t>podrobných</a:t>
             </a:r>
@@ -7422,7 +7353,6 @@
                   <a:srgbClr val="030712"/>
                 </a:solidFill>
                 <a:effectLst/>
-                <a:latin typeface="ui-sans-serif"/>
               </a:rPr>
               <a:t> </a:t>
             </a:r>
@@ -7432,7 +7362,6 @@
                   <a:srgbClr val="030712"/>
                 </a:solidFill>
                 <a:effectLst/>
-                <a:latin typeface="ui-sans-serif"/>
               </a:rPr>
               <a:t>reportů</a:t>
             </a:r>
@@ -7441,7 +7370,6 @@
                 <a:srgbClr val="030712"/>
               </a:solidFill>
               <a:effectLst/>
-              <a:latin typeface="ui-sans-serif"/>
             </a:endParaRPr>
           </a:p>
         </p:txBody>
@@ -7596,7 +7524,6 @@
                   <a:srgbClr val="030712"/>
                 </a:solidFill>
                 <a:effectLst/>
-                <a:latin typeface="ui-sans-serif"/>
               </a:rPr>
               <a:t>V</a:t>
             </a:r>
@@ -7606,7 +7533,6 @@
                   <a:srgbClr val="030712"/>
                 </a:solidFill>
                 <a:effectLst/>
-                <a:latin typeface="ui-sans-serif"/>
               </a:rPr>
               <a:t>ytvoření</a:t>
             </a:r>
@@ -7616,7 +7542,6 @@
                   <a:srgbClr val="030712"/>
                 </a:solidFill>
                 <a:effectLst/>
-                <a:latin typeface="ui-sans-serif"/>
               </a:rPr>
               <a:t> </a:t>
             </a:r>
@@ -7626,7 +7551,6 @@
                   <a:srgbClr val="030712"/>
                 </a:solidFill>
                 <a:effectLst/>
-                <a:latin typeface="ui-sans-serif"/>
               </a:rPr>
               <a:t>dvou</a:t>
             </a:r>
@@ -7636,7 +7560,6 @@
                   <a:srgbClr val="030712"/>
                 </a:solidFill>
                 <a:effectLst/>
-                <a:latin typeface="ui-sans-serif"/>
               </a:rPr>
               <a:t> </a:t>
             </a:r>
@@ -7646,7 +7569,6 @@
                   <a:srgbClr val="030712"/>
                 </a:solidFill>
                 <a:effectLst/>
-                <a:latin typeface="ui-sans-serif"/>
               </a:rPr>
               <a:t>testovacích</a:t>
             </a:r>
@@ -7656,7 +7578,6 @@
                   <a:srgbClr val="030712"/>
                 </a:solidFill>
                 <a:effectLst/>
-                <a:latin typeface="ui-sans-serif"/>
               </a:rPr>
               <a:t> </a:t>
             </a:r>
@@ -7666,7 +7587,6 @@
                   <a:srgbClr val="030712"/>
                 </a:solidFill>
                 <a:effectLst/>
-                <a:latin typeface="ui-sans-serif"/>
               </a:rPr>
               <a:t>uzlů</a:t>
             </a:r>
@@ -7676,7 +7596,6 @@
                   <a:srgbClr val="030712"/>
                 </a:solidFill>
                 <a:effectLst/>
-                <a:latin typeface="ui-sans-serif"/>
               </a:rPr>
               <a:t> (server a </a:t>
             </a:r>
@@ -7686,7 +7605,6 @@
                   <a:srgbClr val="030712"/>
                 </a:solidFill>
                 <a:effectLst/>
-                <a:latin typeface="ui-sans-serif"/>
               </a:rPr>
               <a:t>klient</a:t>
             </a:r>
@@ -7696,7 +7614,6 @@
                   <a:srgbClr val="030712"/>
                 </a:solidFill>
                 <a:effectLst/>
-                <a:latin typeface="ui-sans-serif"/>
               </a:rPr>
               <a:t>)</a:t>
             </a:r>
@@ -7705,7 +7622,6 @@
                 <a:srgbClr val="030712"/>
               </a:solidFill>
               <a:effectLst/>
-              <a:latin typeface="ui-sans-serif"/>
             </a:endParaRPr>
           </a:p>
           <a:p>
@@ -7722,7 +7638,6 @@
                   <a:srgbClr val="030712"/>
                 </a:solidFill>
                 <a:effectLst/>
-                <a:latin typeface="ui-sans-serif"/>
               </a:rPr>
               <a:t>Testování</a:t>
             </a:r>
@@ -7732,7 +7647,6 @@
                   <a:srgbClr val="030712"/>
                 </a:solidFill>
                 <a:effectLst/>
-                <a:latin typeface="ui-sans-serif"/>
               </a:rPr>
               <a:t> </a:t>
             </a:r>
@@ -7742,7 +7656,6 @@
                   <a:srgbClr val="030712"/>
                 </a:solidFill>
                 <a:effectLst/>
-                <a:latin typeface="ui-sans-serif"/>
               </a:rPr>
               <a:t>všech</a:t>
             </a:r>
@@ -7752,7 +7665,6 @@
                   <a:srgbClr val="030712"/>
                 </a:solidFill>
                 <a:effectLst/>
-                <a:latin typeface="ui-sans-serif"/>
               </a:rPr>
               <a:t> 108 </a:t>
             </a:r>
@@ -7762,7 +7674,6 @@
                   <a:srgbClr val="030712"/>
                 </a:solidFill>
                 <a:effectLst/>
-                <a:latin typeface="ui-sans-serif"/>
               </a:rPr>
               <a:t>kombinací</a:t>
             </a:r>
@@ -7772,7 +7683,6 @@
                   <a:srgbClr val="030712"/>
                 </a:solidFill>
                 <a:effectLst/>
-                <a:latin typeface="ui-sans-serif"/>
               </a:rPr>
               <a:t> </a:t>
             </a:r>
@@ -7782,7 +7692,6 @@
                   <a:srgbClr val="030712"/>
                 </a:solidFill>
                 <a:effectLst/>
-                <a:latin typeface="ui-sans-serif"/>
               </a:rPr>
               <a:t>kryptografických</a:t>
             </a:r>
@@ -7792,7 +7701,6 @@
                   <a:srgbClr val="030712"/>
                 </a:solidFill>
                 <a:effectLst/>
-                <a:latin typeface="ui-sans-serif"/>
               </a:rPr>
               <a:t> </a:t>
             </a:r>
@@ -7802,7 +7710,6 @@
                   <a:srgbClr val="030712"/>
                 </a:solidFill>
                 <a:effectLst/>
-                <a:latin typeface="ui-sans-serif"/>
               </a:rPr>
               <a:t>algoritmů</a:t>
             </a:r>
@@ -7812,7 +7719,6 @@
                   <a:srgbClr val="030712"/>
                 </a:solidFill>
                 <a:effectLst/>
-                <a:latin typeface="ui-sans-serif"/>
               </a:rPr>
               <a:t>:</a:t>
             </a:r>
@@ -7820,7 +7726,6 @@
               <a:solidFill>
                 <a:srgbClr val="030712"/>
               </a:solidFill>
-              <a:latin typeface="ui-sans-serif"/>
             </a:endParaRPr>
           </a:p>
           <a:p>
@@ -7835,7 +7740,6 @@
                   <a:srgbClr val="030712"/>
                 </a:solidFill>
                 <a:effectLst/>
-                <a:latin typeface="ui-sans-serif"/>
               </a:rPr>
               <a:t>9 variant </a:t>
             </a:r>
@@ -7845,7 +7749,6 @@
                   <a:srgbClr val="030712"/>
                 </a:solidFill>
                 <a:effectLst/>
-                <a:latin typeface="ui-sans-serif"/>
               </a:rPr>
               <a:t>výměny</a:t>
             </a:r>
@@ -7855,7 +7758,6 @@
                   <a:srgbClr val="030712"/>
                 </a:solidFill>
                 <a:effectLst/>
-                <a:latin typeface="ui-sans-serif"/>
               </a:rPr>
               <a:t> </a:t>
             </a:r>
@@ -7865,7 +7767,6 @@
                   <a:srgbClr val="030712"/>
                 </a:solidFill>
                 <a:effectLst/>
-                <a:latin typeface="ui-sans-serif"/>
               </a:rPr>
               <a:t>klíčů</a:t>
             </a:r>
@@ -7875,7 +7776,6 @@
                   <a:srgbClr val="030712"/>
                 </a:solidFill>
                 <a:effectLst/>
-                <a:latin typeface="ui-sans-serif"/>
               </a:rPr>
               <a:t> × 2 </a:t>
             </a:r>
@@ -7885,7 +7785,6 @@
                   <a:srgbClr val="030712"/>
                 </a:solidFill>
                 <a:effectLst/>
-                <a:latin typeface="ui-sans-serif"/>
               </a:rPr>
               <a:t>symetrické</a:t>
             </a:r>
@@ -7895,7 +7794,6 @@
                   <a:srgbClr val="030712"/>
                 </a:solidFill>
                 <a:effectLst/>
-                <a:latin typeface="ui-sans-serif"/>
               </a:rPr>
               <a:t> </a:t>
             </a:r>
@@ -7905,7 +7803,6 @@
                   <a:srgbClr val="030712"/>
                 </a:solidFill>
                 <a:effectLst/>
-                <a:latin typeface="ui-sans-serif"/>
               </a:rPr>
               <a:t>algoritmy</a:t>
             </a:r>
@@ -7915,7 +7812,6 @@
                   <a:srgbClr val="030712"/>
                 </a:solidFill>
                 <a:effectLst/>
-                <a:latin typeface="ui-sans-serif"/>
               </a:rPr>
               <a:t> × 6 </a:t>
             </a:r>
@@ -7925,7 +7821,6 @@
                   <a:srgbClr val="030712"/>
                 </a:solidFill>
                 <a:effectLst/>
-                <a:latin typeface="ui-sans-serif"/>
               </a:rPr>
               <a:t>algoritmů</a:t>
             </a:r>
@@ -7935,7 +7830,6 @@
                   <a:srgbClr val="030712"/>
                 </a:solidFill>
                 <a:effectLst/>
-                <a:latin typeface="ui-sans-serif"/>
               </a:rPr>
               <a:t> </a:t>
             </a:r>
@@ -7945,7 +7839,6 @@
                   <a:srgbClr val="030712"/>
                 </a:solidFill>
                 <a:effectLst/>
-                <a:latin typeface="ui-sans-serif"/>
               </a:rPr>
               <a:t>podpisu</a:t>
             </a:r>
@@ -7953,7 +7846,6 @@
               <a:solidFill>
                 <a:srgbClr val="030712"/>
               </a:solidFill>
-              <a:latin typeface="ui-sans-serif"/>
             </a:endParaRPr>
           </a:p>
           <a:p>
@@ -7970,7 +7862,6 @@
                   <a:srgbClr val="030712"/>
                 </a:solidFill>
                 <a:effectLst/>
-                <a:latin typeface="ui-sans-serif"/>
               </a:rPr>
               <a:t>Pro </a:t>
             </a:r>
@@ -7980,7 +7871,6 @@
                   <a:srgbClr val="030712"/>
                 </a:solidFill>
                 <a:effectLst/>
-                <a:latin typeface="ui-sans-serif"/>
               </a:rPr>
               <a:t>každou</a:t>
             </a:r>
@@ -7990,7 +7880,6 @@
                   <a:srgbClr val="030712"/>
                 </a:solidFill>
                 <a:effectLst/>
-                <a:latin typeface="ui-sans-serif"/>
               </a:rPr>
               <a:t> </a:t>
             </a:r>
@@ -8000,7 +7889,6 @@
                   <a:srgbClr val="030712"/>
                 </a:solidFill>
                 <a:effectLst/>
-                <a:latin typeface="ui-sans-serif"/>
               </a:rPr>
               <a:t>kombinaci</a:t>
             </a:r>
@@ -8010,7 +7898,6 @@
                   <a:srgbClr val="030712"/>
                 </a:solidFill>
                 <a:effectLst/>
-                <a:latin typeface="ui-sans-serif"/>
               </a:rPr>
               <a:t> </a:t>
             </a:r>
@@ -8020,7 +7907,6 @@
                   <a:srgbClr val="030712"/>
                 </a:solidFill>
                 <a:effectLst/>
-                <a:latin typeface="ui-sans-serif"/>
               </a:rPr>
               <a:t>testuje</a:t>
             </a:r>
@@ -8030,7 +7916,6 @@
                   <a:srgbClr val="030712"/>
                 </a:solidFill>
                 <a:effectLst/>
-                <a:latin typeface="ui-sans-serif"/>
               </a:rPr>
               <a:t>:</a:t>
             </a:r>
@@ -8047,7 +7932,6 @@
                   <a:srgbClr val="030712"/>
                 </a:solidFill>
                 <a:effectLst/>
-                <a:latin typeface="ui-sans-serif"/>
               </a:rPr>
               <a:t>Navázání</a:t>
             </a:r>
@@ -8057,7 +7941,6 @@
                   <a:srgbClr val="030712"/>
                 </a:solidFill>
                 <a:effectLst/>
-                <a:latin typeface="ui-sans-serif"/>
               </a:rPr>
               <a:t> </a:t>
             </a:r>
@@ -8067,7 +7950,6 @@
                   <a:srgbClr val="030712"/>
                 </a:solidFill>
                 <a:effectLst/>
-                <a:latin typeface="ui-sans-serif"/>
               </a:rPr>
               <a:t>spojení</a:t>
             </a:r>
@@ -8077,7 +7959,6 @@
                   <a:srgbClr val="030712"/>
                 </a:solidFill>
                 <a:effectLst/>
-                <a:latin typeface="ui-sans-serif"/>
               </a:rPr>
               <a:t> </a:t>
             </a:r>
@@ -8087,7 +7968,6 @@
                   <a:srgbClr val="030712"/>
                 </a:solidFill>
                 <a:effectLst/>
-                <a:latin typeface="ui-sans-serif"/>
               </a:rPr>
               <a:t>mezi</a:t>
             </a:r>
@@ -8097,7 +7977,6 @@
                   <a:srgbClr val="030712"/>
                 </a:solidFill>
                 <a:effectLst/>
-                <a:latin typeface="ui-sans-serif"/>
               </a:rPr>
               <a:t> </a:t>
             </a:r>
@@ -8107,7 +7986,6 @@
                   <a:srgbClr val="030712"/>
                 </a:solidFill>
                 <a:effectLst/>
-                <a:latin typeface="ui-sans-serif"/>
               </a:rPr>
               <a:t>uzly</a:t>
             </a:r>
@@ -8116,7 +7994,6 @@
                 <a:srgbClr val="030712"/>
               </a:solidFill>
               <a:effectLst/>
-              <a:latin typeface="ui-sans-serif"/>
             </a:endParaRPr>
           </a:p>
           <a:p>
@@ -8131,7 +8008,6 @@
                   <a:srgbClr val="030712"/>
                 </a:solidFill>
                 <a:effectLst/>
-                <a:latin typeface="ui-sans-serif"/>
               </a:rPr>
               <a:t>Výměnu</a:t>
             </a:r>
@@ -8141,7 +8017,6 @@
                   <a:srgbClr val="030712"/>
                 </a:solidFill>
                 <a:effectLst/>
-                <a:latin typeface="ui-sans-serif"/>
               </a:rPr>
               <a:t> </a:t>
             </a:r>
@@ -8151,7 +8026,6 @@
                   <a:srgbClr val="030712"/>
                 </a:solidFill>
                 <a:effectLst/>
-                <a:latin typeface="ui-sans-serif"/>
               </a:rPr>
               <a:t>klíčů</a:t>
             </a:r>
@@ -8161,7 +8035,6 @@
                   <a:srgbClr val="030712"/>
                 </a:solidFill>
                 <a:effectLst/>
-                <a:latin typeface="ui-sans-serif"/>
               </a:rPr>
               <a:t> a </a:t>
             </a:r>
@@ -8171,7 +8044,6 @@
                   <a:srgbClr val="030712"/>
                 </a:solidFill>
                 <a:effectLst/>
-                <a:latin typeface="ui-sans-serif"/>
               </a:rPr>
               <a:t>její</a:t>
             </a:r>
@@ -8181,7 +8053,6 @@
                   <a:srgbClr val="030712"/>
                 </a:solidFill>
                 <a:effectLst/>
-                <a:latin typeface="ui-sans-serif"/>
               </a:rPr>
               <a:t> </a:t>
             </a:r>
@@ -8191,7 +8062,6 @@
                   <a:srgbClr val="030712"/>
                 </a:solidFill>
                 <a:effectLst/>
-                <a:latin typeface="ui-sans-serif"/>
               </a:rPr>
               <a:t>rychlost</a:t>
             </a:r>
@@ -8200,7 +8070,6 @@
                 <a:srgbClr val="030712"/>
               </a:solidFill>
               <a:effectLst/>
-              <a:latin typeface="ui-sans-serif"/>
             </a:endParaRPr>
           </a:p>
           <a:p>
@@ -8215,7 +8084,6 @@
                   <a:srgbClr val="030712"/>
                 </a:solidFill>
                 <a:effectLst/>
-                <a:latin typeface="ui-sans-serif"/>
               </a:rPr>
               <a:t>Základní</a:t>
             </a:r>
@@ -8225,7 +8093,6 @@
                   <a:srgbClr val="030712"/>
                 </a:solidFill>
                 <a:effectLst/>
-                <a:latin typeface="ui-sans-serif"/>
               </a:rPr>
               <a:t> </a:t>
             </a:r>
@@ -8235,7 +8102,6 @@
                   <a:srgbClr val="030712"/>
                 </a:solidFill>
                 <a:effectLst/>
-                <a:latin typeface="ui-sans-serif"/>
               </a:rPr>
               <a:t>zasílání</a:t>
             </a:r>
@@ -8245,7 +8111,6 @@
                   <a:srgbClr val="030712"/>
                 </a:solidFill>
                 <a:effectLst/>
-                <a:latin typeface="ui-sans-serif"/>
               </a:rPr>
               <a:t> </a:t>
             </a:r>
@@ -8255,7 +8120,6 @@
                   <a:srgbClr val="030712"/>
                 </a:solidFill>
                 <a:effectLst/>
-                <a:latin typeface="ui-sans-serif"/>
               </a:rPr>
               <a:t>zpráv</a:t>
             </a:r>
@@ -8264,7 +8128,6 @@
                 <a:srgbClr val="030712"/>
               </a:solidFill>
               <a:effectLst/>
-              <a:latin typeface="ui-sans-serif"/>
             </a:endParaRPr>
           </a:p>
           <a:p>
@@ -8279,7 +8142,6 @@
                   <a:srgbClr val="030712"/>
                 </a:solidFill>
                 <a:effectLst/>
-                <a:latin typeface="ui-sans-serif"/>
               </a:rPr>
               <a:t>Přenos</a:t>
             </a:r>
@@ -8289,7 +8151,6 @@
                   <a:srgbClr val="030712"/>
                 </a:solidFill>
                 <a:effectLst/>
-                <a:latin typeface="ui-sans-serif"/>
               </a:rPr>
               <a:t> </a:t>
             </a:r>
@@ -8299,7 +8160,6 @@
                   <a:srgbClr val="030712"/>
                 </a:solidFill>
                 <a:effectLst/>
-                <a:latin typeface="ui-sans-serif"/>
               </a:rPr>
               <a:t>souborů</a:t>
             </a:r>
@@ -8309,7 +8169,6 @@
                   <a:srgbClr val="030712"/>
                 </a:solidFill>
                 <a:effectLst/>
-                <a:latin typeface="ui-sans-serif"/>
               </a:rPr>
               <a:t> </a:t>
             </a:r>
@@ -8319,7 +8178,6 @@
                   <a:srgbClr val="030712"/>
                 </a:solidFill>
                 <a:effectLst/>
-                <a:latin typeface="ui-sans-serif"/>
               </a:rPr>
               <a:t>různých</a:t>
             </a:r>
@@ -8329,7 +8187,6 @@
                   <a:srgbClr val="030712"/>
                 </a:solidFill>
                 <a:effectLst/>
-                <a:latin typeface="ui-sans-serif"/>
               </a:rPr>
               <a:t> </a:t>
             </a:r>
@@ -8339,7 +8196,6 @@
                   <a:srgbClr val="030712"/>
                 </a:solidFill>
                 <a:effectLst/>
-                <a:latin typeface="ui-sans-serif"/>
               </a:rPr>
               <a:t>velikostí</a:t>
             </a:r>
@@ -8349,7 +8205,6 @@
                   <a:srgbClr val="030712"/>
                 </a:solidFill>
                 <a:effectLst/>
-                <a:latin typeface="ui-sans-serif"/>
               </a:rPr>
               <a:t> (10 KB, 100 KB, 1 MB)</a:t>
             </a:r>
@@ -8358,7 +8213,6 @@
                 <a:srgbClr val="030712"/>
               </a:solidFill>
               <a:effectLst/>
-              <a:latin typeface="ui-sans-serif"/>
             </a:endParaRPr>
           </a:p>
           <a:p>
@@ -8375,7 +8229,6 @@
                   <a:srgbClr val="030712"/>
                 </a:solidFill>
                 <a:effectLst/>
-                <a:latin typeface="ui-sans-serif"/>
               </a:rPr>
               <a:t>Měření</a:t>
             </a:r>
@@ -8385,7 +8238,6 @@
                   <a:srgbClr val="030712"/>
                 </a:solidFill>
                 <a:effectLst/>
-                <a:latin typeface="ui-sans-serif"/>
               </a:rPr>
               <a:t> </a:t>
             </a:r>
@@ -8395,7 +8247,6 @@
                   <a:srgbClr val="030712"/>
                 </a:solidFill>
                 <a:effectLst/>
-                <a:latin typeface="ui-sans-serif"/>
               </a:rPr>
               <a:t>výkonnostních</a:t>
             </a:r>
@@ -8405,7 +8256,6 @@
                   <a:srgbClr val="030712"/>
                 </a:solidFill>
                 <a:effectLst/>
-                <a:latin typeface="ui-sans-serif"/>
               </a:rPr>
               <a:t> </a:t>
             </a:r>
@@ -8415,7 +8265,6 @@
                   <a:srgbClr val="030712"/>
                 </a:solidFill>
                 <a:effectLst/>
-                <a:latin typeface="ui-sans-serif"/>
               </a:rPr>
               <a:t>metrik</a:t>
             </a:r>
@@ -8425,7 +8274,6 @@
                   <a:srgbClr val="030712"/>
                 </a:solidFill>
                 <a:effectLst/>
-                <a:latin typeface="ui-sans-serif"/>
               </a:rPr>
               <a:t>:</a:t>
             </a:r>
@@ -8442,7 +8290,6 @@
                   <a:srgbClr val="030712"/>
                 </a:solidFill>
                 <a:effectLst/>
-                <a:latin typeface="ui-sans-serif"/>
               </a:rPr>
               <a:t>Doba </a:t>
             </a:r>
@@ -8452,7 +8299,6 @@
                   <a:srgbClr val="030712"/>
                 </a:solidFill>
                 <a:effectLst/>
-                <a:latin typeface="ui-sans-serif"/>
               </a:rPr>
               <a:t>výměny</a:t>
             </a:r>
@@ -8462,7 +8308,6 @@
                   <a:srgbClr val="030712"/>
                 </a:solidFill>
                 <a:effectLst/>
-                <a:latin typeface="ui-sans-serif"/>
               </a:rPr>
               <a:t> </a:t>
             </a:r>
@@ -8472,7 +8317,6 @@
                   <a:srgbClr val="030712"/>
                 </a:solidFill>
                 <a:effectLst/>
-                <a:latin typeface="ui-sans-serif"/>
               </a:rPr>
               <a:t>klíčů</a:t>
             </a:r>
@@ -8481,7 +8325,6 @@
                 <a:srgbClr val="030712"/>
               </a:solidFill>
               <a:effectLst/>
-              <a:latin typeface="ui-sans-serif"/>
             </a:endParaRPr>
           </a:p>
           <a:p>
@@ -8496,7 +8339,6 @@
                   <a:srgbClr val="030712"/>
                 </a:solidFill>
                 <a:effectLst/>
-                <a:latin typeface="ui-sans-serif"/>
               </a:rPr>
               <a:t>Rychlost</a:t>
             </a:r>
@@ -8506,7 +8348,6 @@
                   <a:srgbClr val="030712"/>
                 </a:solidFill>
                 <a:effectLst/>
-                <a:latin typeface="ui-sans-serif"/>
               </a:rPr>
               <a:t> </a:t>
             </a:r>
@@ -8516,7 +8357,6 @@
                   <a:srgbClr val="030712"/>
                 </a:solidFill>
                 <a:effectLst/>
-                <a:latin typeface="ui-sans-serif"/>
               </a:rPr>
               <a:t>přenosu</a:t>
             </a:r>
@@ -8526,7 +8366,6 @@
                   <a:srgbClr val="030712"/>
                 </a:solidFill>
                 <a:effectLst/>
-                <a:latin typeface="ui-sans-serif"/>
               </a:rPr>
               <a:t> </a:t>
             </a:r>
@@ -8536,7 +8375,6 @@
                   <a:srgbClr val="030712"/>
                 </a:solidFill>
                 <a:effectLst/>
-                <a:latin typeface="ui-sans-serif"/>
               </a:rPr>
               <a:t>souborů</a:t>
             </a:r>
@@ -8546,30 +8384,91 @@
                   <a:srgbClr val="030712"/>
                 </a:solidFill>
                 <a:effectLst/>
-                <a:latin typeface="ui-sans-serif"/>
               </a:rPr>
               <a:t> (KB/s)</a:t>
             </a:r>
           </a:p>
           <a:p>
-            <a:pPr marL="457200" lvl="1" indent="0" algn="l">
-              <a:spcBef>
-                <a:spcPts val="900"/>
-              </a:spcBef>
+            <a:pPr marL="0" indent="0">
               <a:buNone/>
             </a:pPr>
-            <a:endParaRPr lang="en-GB" b="0" i="0" dirty="0">
-              <a:solidFill>
-                <a:srgbClr val="030712"/>
-              </a:solidFill>
-              <a:effectLst/>
-              <a:latin typeface="ui-sans-serif"/>
-            </a:endParaRPr>
-          </a:p>
-          <a:p>
-            <a:pPr>
+            <a:r>
+              <a:rPr lang="cs-CZ" sz="2600" dirty="0"/>
+              <a:t>5.       </a:t>
+            </a:r>
+            <a:r>
+              <a:rPr lang="en-GB" sz="2900" dirty="0" err="1">
+                <a:solidFill>
+                  <a:srgbClr val="030712"/>
+                </a:solidFill>
+              </a:rPr>
+              <a:t>Generování</a:t>
+            </a:r>
+            <a:r>
+              <a:rPr lang="en-GB" sz="2900" dirty="0">
+                <a:solidFill>
+                  <a:srgbClr val="030712"/>
+                </a:solidFill>
+              </a:rPr>
+              <a:t> </a:t>
+            </a:r>
+            <a:r>
+              <a:rPr lang="en-GB" sz="2900" dirty="0" err="1">
+                <a:solidFill>
+                  <a:srgbClr val="030712"/>
+                </a:solidFill>
+              </a:rPr>
+              <a:t>podrobného</a:t>
+            </a:r>
+            <a:r>
+              <a:rPr lang="en-GB" sz="2900" dirty="0">
+                <a:solidFill>
+                  <a:srgbClr val="030712"/>
+                </a:solidFill>
+              </a:rPr>
+              <a:t> </a:t>
+            </a:r>
+            <a:r>
+              <a:rPr lang="en-GB" sz="2900" dirty="0" err="1">
+                <a:solidFill>
+                  <a:srgbClr val="030712"/>
+                </a:solidFill>
+              </a:rPr>
+              <a:t>reportu</a:t>
+            </a:r>
+            <a:r>
+              <a:rPr lang="en-GB" sz="2900" dirty="0">
+                <a:solidFill>
+                  <a:srgbClr val="030712"/>
+                </a:solidFill>
+              </a:rPr>
+              <a:t> s </a:t>
+            </a:r>
+            <a:r>
+              <a:rPr lang="en-GB" sz="2900" dirty="0" err="1">
+                <a:solidFill>
+                  <a:srgbClr val="030712"/>
+                </a:solidFill>
+              </a:rPr>
+              <a:t>výsledky</a:t>
+            </a:r>
+            <a:r>
+              <a:rPr lang="cs-CZ" sz="2900" dirty="0">
+                <a:solidFill>
+                  <a:srgbClr val="030712"/>
+                </a:solidFill>
+              </a:rPr>
+              <a:t> do souboru (viz dokumentace)</a:t>
+            </a:r>
+          </a:p>
+          <a:p>
+            <a:pPr marL="0" indent="0">
               <a:buNone/>
             </a:pPr>
+            <a:r>
+              <a:rPr lang="cs-CZ" dirty="0"/>
+              <a:t>	</a:t>
+            </a:r>
             <a:br>
               <a:rPr lang="en-GB" dirty="0"/>
             </a:br>
@@ -10713,7 +10612,13 @@
   <p:cSld>
     <p:spTree>
       <p:nvGrpSpPr>
-        <p:cNvPr id="1" name=""/>
+        <p:cNvPr id="1" name="">
+          <a:extLst>
+            <a:ext uri="{FF2B5EF4-FFF2-40B4-BE49-F238E27FC236}">
+              <a16:creationId xmlns:a16="http://schemas.microsoft.com/office/drawing/2014/main" id="{C70EB770-69D7-3DDA-80E2-3972556E773D}"/>
+            </a:ext>
+          </a:extLst>
+        </p:cNvPr>
         <p:cNvGrpSpPr/>
         <p:nvPr/>
       </p:nvGrpSpPr>
@@ -10727,10 +10632,39 @@
       </p:grpSpPr>
       <p:sp>
         <p:nvSpPr>
+          <p:cNvPr id="5" name="Zástupný symbol pro číslo snímku 4">
+            <a:extLst>
+              <a:ext uri="{FF2B5EF4-FFF2-40B4-BE49-F238E27FC236}">
+                <a16:creationId xmlns:a16="http://schemas.microsoft.com/office/drawing/2014/main" id="{036DE37F-4A04-6B26-F32A-742CAAE6BFD6}"/>
+              </a:ext>
+            </a:extLst>
+          </p:cNvPr>
+          <p:cNvSpPr>
+            <a:spLocks noGrp="1"/>
+          </p:cNvSpPr>
+          <p:nvPr>
+            <p:ph type="sldNum" sz="quarter" idx="12"/>
+          </p:nvPr>
+        </p:nvSpPr>
+        <p:spPr/>
+        <p:txBody>
+          <a:bodyPr/>
+          <a:lstStyle/>
+          <a:p>
+            <a:fld id="{2396986B-09E1-422F-9D6D-F3432B0D2D09}" type="slidenum">
+              <a:rPr lang="en-GB" smtClean="0"/>
+              <a:t>21</a:t>
+            </a:fld>
+            <a:endParaRPr lang="en-GB"/>
+          </a:p>
+        </p:txBody>
+      </p:sp>
+      <p:sp>
+        <p:nvSpPr>
           <p:cNvPr id="6" name="Obdélník 5">
             <a:extLst>
               <a:ext uri="{FF2B5EF4-FFF2-40B4-BE49-F238E27FC236}">
-                <a16:creationId xmlns:a16="http://schemas.microsoft.com/office/drawing/2014/main" id="{9AB1E2E0-E445-7609-3BC3-2408D765191C}"/>
+                <a16:creationId xmlns:a16="http://schemas.microsoft.com/office/drawing/2014/main" id="{B3C17B4D-FA4E-2C44-823B-53BA2A4A340E}"/>
               </a:ext>
             </a:extLst>
           </p:cNvPr>
@@ -10773,16 +10707,16 @@
           <a:lstStyle/>
           <a:p>
             <a:pPr algn="ctr"/>
-            <a:endParaRPr lang="en-GB"/>
-          </a:p>
-        </p:txBody>
-      </p:sp>
-      <p:sp>
-        <p:nvSpPr>
-          <p:cNvPr id="2" name="Nadpis 1">
-            <a:extLst>
-              <a:ext uri="{FF2B5EF4-FFF2-40B4-BE49-F238E27FC236}">
-                <a16:creationId xmlns:a16="http://schemas.microsoft.com/office/drawing/2014/main" id="{E85E28AF-D31F-9986-04D8-696B845F2560}"/>
+            <a:endParaRPr lang="en-GB" dirty="0"/>
+          </a:p>
+        </p:txBody>
+      </p:sp>
+      <p:sp>
+        <p:nvSpPr>
+          <p:cNvPr id="7" name="Nadpis 1">
+            <a:extLst>
+              <a:ext uri="{FF2B5EF4-FFF2-40B4-BE49-F238E27FC236}">
+                <a16:creationId xmlns:a16="http://schemas.microsoft.com/office/drawing/2014/main" id="{13BE714C-A469-0EE0-19E9-9CB6F75CFE7F}"/>
               </a:ext>
             </a:extLst>
           </p:cNvPr>
@@ -10795,7 +10729,7 @@
         </p:nvSpPr>
         <p:spPr>
           <a:xfrm>
-            <a:off x="0" y="-11363"/>
+            <a:off x="0" y="0"/>
             <a:ext cx="10515600" cy="1325563"/>
           </a:xfrm>
         </p:spPr>
@@ -10804,20 +10738,12 @@
           <a:lstStyle/>
           <a:p>
             <a:r>
-              <a:rPr lang="cs-CZ" dirty="0" err="1">
+              <a:rPr lang="cs-CZ" dirty="0">
                 <a:solidFill>
                   <a:srgbClr val="FF0000"/>
                 </a:solidFill>
               </a:rPr>
-              <a:t>Ukazka</a:t>
-            </a:r>
-            <a:r>
-              <a:rPr lang="cs-CZ" dirty="0">
-                <a:solidFill>
-                  <a:srgbClr val="FF0000"/>
-                </a:solidFill>
-              </a:rPr>
-              <a:t> Aplikace</a:t>
+              <a:t>Závěr testování</a:t>
             </a:r>
             <a:endParaRPr lang="en-GB" dirty="0">
               <a:solidFill>
@@ -10827,74 +10753,12 @@
           </a:p>
         </p:txBody>
       </p:sp>
-      <p:sp>
-        <p:nvSpPr>
-          <p:cNvPr id="3" name="Zástupný obsah 2">
-            <a:extLst>
-              <a:ext uri="{FF2B5EF4-FFF2-40B4-BE49-F238E27FC236}">
-                <a16:creationId xmlns:a16="http://schemas.microsoft.com/office/drawing/2014/main" id="{D0CB7290-F736-14F9-C8FD-B9CDA15801A9}"/>
-              </a:ext>
-            </a:extLst>
-          </p:cNvPr>
-          <p:cNvSpPr>
-            <a:spLocks noGrp="1"/>
-          </p:cNvSpPr>
-          <p:nvPr>
-            <p:ph sz="half" idx="1"/>
-          </p:nvPr>
-        </p:nvSpPr>
-        <p:spPr>
-          <a:xfrm>
-            <a:off x="372324" y="1690688"/>
-            <a:ext cx="11447352" cy="4351338"/>
-          </a:xfrm>
-        </p:spPr>
-        <p:txBody>
-          <a:bodyPr/>
-          <a:lstStyle/>
-          <a:p>
-            <a:pPr marL="0" indent="0">
-              <a:buNone/>
-            </a:pPr>
-            <a:endParaRPr lang="cs-CZ" dirty="0"/>
-          </a:p>
-        </p:txBody>
-      </p:sp>
-      <p:sp>
-        <p:nvSpPr>
-          <p:cNvPr id="5" name="Zástupný symbol pro číslo snímku 4">
-            <a:extLst>
-              <a:ext uri="{FF2B5EF4-FFF2-40B4-BE49-F238E27FC236}">
-                <a16:creationId xmlns:a16="http://schemas.microsoft.com/office/drawing/2014/main" id="{A4AF7EF7-19BA-3A65-E16C-250A6BF0B8F4}"/>
-              </a:ext>
-            </a:extLst>
-          </p:cNvPr>
-          <p:cNvSpPr>
-            <a:spLocks noGrp="1"/>
-          </p:cNvSpPr>
-          <p:nvPr>
-            <p:ph type="sldNum" sz="quarter" idx="12"/>
-          </p:nvPr>
-        </p:nvSpPr>
-        <p:spPr/>
-        <p:txBody>
-          <a:bodyPr/>
-          <a:lstStyle/>
-          <a:p>
-            <a:fld id="{2396986B-09E1-422F-9D6D-F3432B0D2D09}" type="slidenum">
-              <a:rPr lang="en-GB" smtClean="0"/>
-              <a:t>21</a:t>
-            </a:fld>
-            <a:endParaRPr lang="en-GB"/>
-          </a:p>
-        </p:txBody>
-      </p:sp>
       <p:pic>
         <p:nvPicPr>
-          <p:cNvPr id="7" name="Obrázek 6">
-            <a:extLst>
-              <a:ext uri="{FF2B5EF4-FFF2-40B4-BE49-F238E27FC236}">
-                <a16:creationId xmlns:a16="http://schemas.microsoft.com/office/drawing/2014/main" id="{42C9C5F8-45A3-7588-5E5A-96B6E799EEAA}"/>
+          <p:cNvPr id="8" name="Obrázek 7">
+            <a:extLst>
+              <a:ext uri="{FF2B5EF4-FFF2-40B4-BE49-F238E27FC236}">
+                <a16:creationId xmlns:a16="http://schemas.microsoft.com/office/drawing/2014/main" id="{3A3AB1A1-A34B-23A1-CDFE-8F52F7859B20}"/>
               </a:ext>
             </a:extLst>
           </p:cNvPr>
@@ -10921,10 +10785,10 @@
       </p:pic>
       <p:sp>
         <p:nvSpPr>
-          <p:cNvPr id="8" name="Obdélník 7">
-            <a:extLst>
-              <a:ext uri="{FF2B5EF4-FFF2-40B4-BE49-F238E27FC236}">
-                <a16:creationId xmlns:a16="http://schemas.microsoft.com/office/drawing/2014/main" id="{D2798C63-D0C7-8503-BE22-A0C93FE44363}"/>
+          <p:cNvPr id="9" name="Obdélník 8">
+            <a:extLst>
+              <a:ext uri="{FF2B5EF4-FFF2-40B4-BE49-F238E27FC236}">
+                <a16:creationId xmlns:a16="http://schemas.microsoft.com/office/drawing/2014/main" id="{CA3C4F2C-CD0F-3FD6-E7EE-5FFF2D2864F0}"/>
               </a:ext>
             </a:extLst>
           </p:cNvPr>
@@ -10971,6 +10835,531 @@
           </a:p>
         </p:txBody>
       </p:sp>
+      <p:sp>
+        <p:nvSpPr>
+          <p:cNvPr id="2" name="TextovéPole 1">
+            <a:extLst>
+              <a:ext uri="{FF2B5EF4-FFF2-40B4-BE49-F238E27FC236}">
+                <a16:creationId xmlns:a16="http://schemas.microsoft.com/office/drawing/2014/main" id="{B1F01C82-8E61-60B1-E94C-36AFDE88D582}"/>
+              </a:ext>
+            </a:extLst>
+          </p:cNvPr>
+          <p:cNvSpPr txBox="1"/>
+          <p:nvPr/>
+        </p:nvSpPr>
+        <p:spPr>
+          <a:xfrm>
+            <a:off x="641023" y="1687398"/>
+            <a:ext cx="10180948" cy="2677656"/>
+          </a:xfrm>
+          <a:prstGeom prst="rect">
+            <a:avLst/>
+          </a:prstGeom>
+          <a:noFill/>
+        </p:spPr>
+        <p:txBody>
+          <a:bodyPr wrap="square" rtlCol="0">
+            <a:spAutoFit/>
+          </a:bodyPr>
+          <a:lstStyle/>
+          <a:p>
+            <a:pPr marL="285750" indent="-285750">
+              <a:buFont typeface="Arial" panose="020B0604020202020204" pitchFamily="34" charset="0"/>
+              <a:buChar char="•"/>
+            </a:pPr>
+            <a:r>
+              <a:rPr lang="cs-CZ" sz="2400" dirty="0"/>
+              <a:t>Ú</a:t>
+            </a:r>
+            <a:r>
+              <a:rPr lang="en-GB" sz="2400" dirty="0" err="1"/>
+              <a:t>spěšně</a:t>
+            </a:r>
+            <a:r>
+              <a:rPr lang="en-GB" sz="2400" dirty="0"/>
+              <a:t> </a:t>
+            </a:r>
+            <a:r>
+              <a:rPr lang="en-GB" sz="2400" dirty="0" err="1"/>
+              <a:t>otestov</a:t>
+            </a:r>
+            <a:r>
+              <a:rPr lang="cs-CZ" sz="2400" dirty="0" err="1"/>
+              <a:t>áno</a:t>
+            </a:r>
+            <a:r>
+              <a:rPr lang="en-GB" sz="2400" dirty="0"/>
+              <a:t> </a:t>
+            </a:r>
+            <a:r>
+              <a:rPr lang="en-GB" sz="2400" dirty="0" err="1"/>
+              <a:t>všech</a:t>
+            </a:r>
+            <a:r>
+              <a:rPr lang="en-GB" sz="2400" dirty="0"/>
+              <a:t> 108 </a:t>
+            </a:r>
+            <a:r>
+              <a:rPr lang="en-GB" sz="2400" dirty="0" err="1"/>
+              <a:t>kombinací</a:t>
+            </a:r>
+            <a:r>
+              <a:rPr lang="en-GB" sz="2400" dirty="0"/>
+              <a:t> </a:t>
+            </a:r>
+            <a:r>
+              <a:rPr lang="en-GB" sz="2400" dirty="0" err="1"/>
+              <a:t>kryptografických</a:t>
+            </a:r>
+            <a:r>
+              <a:rPr lang="en-GB" sz="2400" dirty="0"/>
+              <a:t> </a:t>
+            </a:r>
+            <a:r>
+              <a:rPr lang="en-GB" sz="2400" dirty="0" err="1"/>
+              <a:t>algoritmů</a:t>
+            </a:r>
+            <a:endParaRPr lang="cs-CZ" sz="2400" dirty="0"/>
+          </a:p>
+          <a:p>
+            <a:pPr marL="285750" indent="-285750">
+              <a:buFont typeface="Arial" panose="020B0604020202020204" pitchFamily="34" charset="0"/>
+              <a:buChar char="•"/>
+            </a:pPr>
+            <a:endParaRPr lang="cs-CZ" sz="2400" dirty="0"/>
+          </a:p>
+          <a:p>
+            <a:pPr marL="285750" indent="-285750">
+              <a:buFont typeface="Arial" panose="020B0604020202020204" pitchFamily="34" charset="0"/>
+              <a:buChar char="•"/>
+            </a:pPr>
+            <a:r>
+              <a:rPr lang="cs-CZ" sz="2400" dirty="0"/>
+              <a:t>P</a:t>
+            </a:r>
+            <a:r>
+              <a:rPr lang="en-GB" sz="2400" dirty="0" err="1"/>
+              <a:t>otvr</a:t>
+            </a:r>
+            <a:r>
+              <a:rPr lang="cs-CZ" sz="2400" dirty="0" err="1"/>
+              <a:t>zena</a:t>
+            </a:r>
+            <a:r>
+              <a:rPr lang="en-GB" sz="2400" dirty="0"/>
+              <a:t> </a:t>
+            </a:r>
+            <a:r>
+              <a:rPr lang="en-GB" sz="2400" dirty="0" err="1"/>
+              <a:t>vzájemn</a:t>
+            </a:r>
+            <a:r>
+              <a:rPr lang="cs-CZ" sz="2400" dirty="0"/>
+              <a:t>á</a:t>
+            </a:r>
+            <a:r>
+              <a:rPr lang="en-GB" sz="2400" dirty="0"/>
+              <a:t> </a:t>
+            </a:r>
+            <a:r>
+              <a:rPr lang="en-GB" sz="2400" dirty="0" err="1"/>
+              <a:t>kompatibilit</a:t>
+            </a:r>
+            <a:r>
+              <a:rPr lang="cs-CZ" sz="2400" dirty="0"/>
+              <a:t>a algoritmů</a:t>
+            </a:r>
+          </a:p>
+          <a:p>
+            <a:pPr marL="285750" indent="-285750">
+              <a:buFont typeface="Arial" panose="020B0604020202020204" pitchFamily="34" charset="0"/>
+              <a:buChar char="•"/>
+            </a:pPr>
+            <a:endParaRPr lang="cs-CZ" sz="2400" dirty="0"/>
+          </a:p>
+          <a:p>
+            <a:pPr marL="285750" indent="-285750">
+              <a:buFont typeface="Arial" panose="020B0604020202020204" pitchFamily="34" charset="0"/>
+              <a:buChar char="•"/>
+            </a:pPr>
+            <a:r>
+              <a:rPr lang="en-GB" sz="2400" dirty="0" err="1"/>
+              <a:t>Vytvoř</a:t>
+            </a:r>
+            <a:r>
+              <a:rPr lang="cs-CZ" sz="2400" dirty="0" err="1"/>
+              <a:t>eny</a:t>
+            </a:r>
+            <a:r>
+              <a:rPr lang="en-GB" sz="2400" dirty="0"/>
+              <a:t> </a:t>
+            </a:r>
+            <a:r>
+              <a:rPr lang="en-GB" sz="2400" dirty="0" err="1"/>
+              <a:t>podrobné</a:t>
+            </a:r>
+            <a:r>
+              <a:rPr lang="en-GB" sz="2400" dirty="0"/>
+              <a:t> </a:t>
+            </a:r>
+            <a:r>
+              <a:rPr lang="en-GB" sz="2400" dirty="0" err="1"/>
+              <a:t>výkonnostní</a:t>
+            </a:r>
+            <a:r>
+              <a:rPr lang="en-GB" sz="2400" dirty="0"/>
+              <a:t> </a:t>
+            </a:r>
+            <a:r>
+              <a:rPr lang="en-GB" sz="2400" dirty="0" err="1"/>
+              <a:t>profily</a:t>
+            </a:r>
+            <a:endParaRPr lang="cs-CZ" sz="2400" dirty="0"/>
+          </a:p>
+          <a:p>
+            <a:pPr marL="285750" indent="-285750">
+              <a:buFont typeface="Arial" panose="020B0604020202020204" pitchFamily="34" charset="0"/>
+              <a:buChar char="•"/>
+            </a:pPr>
+            <a:endParaRPr lang="cs-CZ" sz="2400" dirty="0"/>
+          </a:p>
+          <a:p>
+            <a:pPr marL="285750" indent="-285750">
+              <a:buFont typeface="Arial" panose="020B0604020202020204" pitchFamily="34" charset="0"/>
+              <a:buChar char="•"/>
+            </a:pPr>
+            <a:r>
+              <a:rPr lang="cs-CZ" sz="2400" dirty="0"/>
+              <a:t>I</a:t>
+            </a:r>
+            <a:r>
+              <a:rPr lang="en-GB" sz="2400" dirty="0" err="1"/>
+              <a:t>dentifikova</a:t>
+            </a:r>
+            <a:r>
+              <a:rPr lang="cs-CZ" sz="2400" dirty="0" err="1"/>
+              <a:t>ny</a:t>
+            </a:r>
+            <a:r>
+              <a:rPr lang="cs-CZ" sz="2400" dirty="0"/>
+              <a:t> </a:t>
+            </a:r>
+            <a:r>
+              <a:rPr lang="en-GB" sz="2400" dirty="0" err="1"/>
+              <a:t>optimální</a:t>
+            </a:r>
+            <a:r>
+              <a:rPr lang="en-GB" sz="2400" dirty="0"/>
+              <a:t> </a:t>
+            </a:r>
+            <a:r>
+              <a:rPr lang="en-GB" sz="2400" dirty="0" err="1"/>
+              <a:t>kombinace</a:t>
+            </a:r>
+            <a:r>
+              <a:rPr lang="en-GB" sz="2400" dirty="0"/>
+              <a:t> </a:t>
+            </a:r>
+            <a:r>
+              <a:rPr lang="en-GB" sz="2400" dirty="0" err="1"/>
+              <a:t>algoritmů</a:t>
+            </a:r>
+            <a:r>
+              <a:rPr lang="en-GB" sz="2400" dirty="0"/>
+              <a:t> pro </a:t>
+            </a:r>
+            <a:r>
+              <a:rPr lang="en-GB" sz="2400" dirty="0" err="1"/>
+              <a:t>různé</a:t>
+            </a:r>
+            <a:r>
+              <a:rPr lang="en-GB" sz="2400" dirty="0"/>
+              <a:t> </a:t>
+            </a:r>
+            <a:r>
+              <a:rPr lang="en-GB" sz="2400" dirty="0" err="1"/>
+              <a:t>případy</a:t>
+            </a:r>
+            <a:r>
+              <a:rPr lang="en-GB" sz="2400" dirty="0"/>
+              <a:t> </a:t>
+            </a:r>
+            <a:r>
+              <a:rPr lang="en-GB" sz="2400" dirty="0" err="1"/>
+              <a:t>použití</a:t>
+            </a:r>
+            <a:endParaRPr lang="en-GB" sz="2400" dirty="0"/>
+          </a:p>
+        </p:txBody>
+      </p:sp>
+    </p:spTree>
+    <p:extLst>
+      <p:ext uri="{BB962C8B-B14F-4D97-AF65-F5344CB8AC3E}">
+        <p14:creationId xmlns:p14="http://schemas.microsoft.com/office/powerpoint/2010/main" val="402179914"/>
+      </p:ext>
+    </p:extLst>
+  </p:cSld>
+  <p:clrMapOvr>
+    <a:masterClrMapping/>
+  </p:clrMapOvr>
+</p:sld>
+</file>
+
+<file path=ppt/slides/slide22.xml><?xml version="1.0" encoding="utf-8"?>
+<p:sld xmlns:a="http://schemas.openxmlformats.org/drawingml/2006/main" xmlns:r="http://schemas.openxmlformats.org/officeDocument/2006/relationships" xmlns:p="http://schemas.openxmlformats.org/presentationml/2006/main">
+  <p:cSld>
+    <p:spTree>
+      <p:nvGrpSpPr>
+        <p:cNvPr id="1" name=""/>
+        <p:cNvGrpSpPr/>
+        <p:nvPr/>
+      </p:nvGrpSpPr>
+      <p:grpSpPr>
+        <a:xfrm>
+          <a:off x="0" y="0"/>
+          <a:ext cx="0" cy="0"/>
+          <a:chOff x="0" y="0"/>
+          <a:chExt cx="0" cy="0"/>
+        </a:xfrm>
+      </p:grpSpPr>
+      <p:sp>
+        <p:nvSpPr>
+          <p:cNvPr id="6" name="Obdélník 5">
+            <a:extLst>
+              <a:ext uri="{FF2B5EF4-FFF2-40B4-BE49-F238E27FC236}">
+                <a16:creationId xmlns:a16="http://schemas.microsoft.com/office/drawing/2014/main" id="{9AB1E2E0-E445-7609-3BC3-2408D765191C}"/>
+              </a:ext>
+            </a:extLst>
+          </p:cNvPr>
+          <p:cNvSpPr/>
+          <p:nvPr/>
+        </p:nvSpPr>
+        <p:spPr>
+          <a:xfrm>
+            <a:off x="0" y="-1"/>
+            <a:ext cx="12192000" cy="1116703"/>
+          </a:xfrm>
+          <a:prstGeom prst="rect">
+            <a:avLst/>
+          </a:prstGeom>
+          <a:solidFill>
+            <a:schemeClr val="bg2"/>
+          </a:solidFill>
+          <a:ln>
+            <a:noFill/>
+          </a:ln>
+        </p:spPr>
+        <p:style>
+          <a:lnRef idx="2">
+            <a:schemeClr val="accent1">
+              <a:shade val="15000"/>
+            </a:schemeClr>
+          </a:lnRef>
+          <a:fillRef idx="1">
+            <a:schemeClr val="accent1"/>
+          </a:fillRef>
+          <a:effectRef idx="0">
+            <a:schemeClr val="accent1"/>
+          </a:effectRef>
+          <a:fontRef idx="minor">
+            <a:schemeClr val="lt1"/>
+          </a:fontRef>
+        </p:style>
+        <p:txBody>
+          <a:bodyPr rtlCol="0" anchor="ctr"/>
+          <a:lstStyle/>
+          <a:p>
+            <a:pPr algn="ctr"/>
+            <a:endParaRPr lang="en-GB"/>
+          </a:p>
+        </p:txBody>
+      </p:sp>
+      <p:sp>
+        <p:nvSpPr>
+          <p:cNvPr id="2" name="Nadpis 1">
+            <a:extLst>
+              <a:ext uri="{FF2B5EF4-FFF2-40B4-BE49-F238E27FC236}">
+                <a16:creationId xmlns:a16="http://schemas.microsoft.com/office/drawing/2014/main" id="{E85E28AF-D31F-9986-04D8-696B845F2560}"/>
+              </a:ext>
+            </a:extLst>
+          </p:cNvPr>
+          <p:cNvSpPr>
+            <a:spLocks noGrp="1"/>
+          </p:cNvSpPr>
+          <p:nvPr>
+            <p:ph type="title"/>
+          </p:nvPr>
+        </p:nvSpPr>
+        <p:spPr>
+          <a:xfrm>
+            <a:off x="0" y="-11363"/>
+            <a:ext cx="10515600" cy="1325563"/>
+          </a:xfrm>
+        </p:spPr>
+        <p:txBody>
+          <a:bodyPr/>
+          <a:lstStyle/>
+          <a:p>
+            <a:r>
+              <a:rPr lang="cs-CZ" dirty="0">
+                <a:solidFill>
+                  <a:srgbClr val="FF0000"/>
+                </a:solidFill>
+              </a:rPr>
+              <a:t>Ukázka Aplikace</a:t>
+            </a:r>
+            <a:endParaRPr lang="en-GB" dirty="0">
+              <a:solidFill>
+                <a:srgbClr val="FF0000"/>
+              </a:solidFill>
+            </a:endParaRPr>
+          </a:p>
+        </p:txBody>
+      </p:sp>
+      <p:sp>
+        <p:nvSpPr>
+          <p:cNvPr id="3" name="Zástupný obsah 2">
+            <a:extLst>
+              <a:ext uri="{FF2B5EF4-FFF2-40B4-BE49-F238E27FC236}">
+                <a16:creationId xmlns:a16="http://schemas.microsoft.com/office/drawing/2014/main" id="{D0CB7290-F736-14F9-C8FD-B9CDA15801A9}"/>
+              </a:ext>
+            </a:extLst>
+          </p:cNvPr>
+          <p:cNvSpPr>
+            <a:spLocks noGrp="1"/>
+          </p:cNvSpPr>
+          <p:nvPr>
+            <p:ph sz="half" idx="1"/>
+          </p:nvPr>
+        </p:nvSpPr>
+        <p:spPr>
+          <a:xfrm>
+            <a:off x="372324" y="1690688"/>
+            <a:ext cx="11447352" cy="4351338"/>
+          </a:xfrm>
+        </p:spPr>
+        <p:txBody>
+          <a:bodyPr/>
+          <a:lstStyle/>
+          <a:p>
+            <a:pPr marL="0" indent="0">
+              <a:buNone/>
+            </a:pPr>
+            <a:endParaRPr lang="cs-CZ" dirty="0"/>
+          </a:p>
+        </p:txBody>
+      </p:sp>
+      <p:sp>
+        <p:nvSpPr>
+          <p:cNvPr id="5" name="Zástupný symbol pro číslo snímku 4">
+            <a:extLst>
+              <a:ext uri="{FF2B5EF4-FFF2-40B4-BE49-F238E27FC236}">
+                <a16:creationId xmlns:a16="http://schemas.microsoft.com/office/drawing/2014/main" id="{A4AF7EF7-19BA-3A65-E16C-250A6BF0B8F4}"/>
+              </a:ext>
+            </a:extLst>
+          </p:cNvPr>
+          <p:cNvSpPr>
+            <a:spLocks noGrp="1"/>
+          </p:cNvSpPr>
+          <p:nvPr>
+            <p:ph type="sldNum" sz="quarter" idx="12"/>
+          </p:nvPr>
+        </p:nvSpPr>
+        <p:spPr/>
+        <p:txBody>
+          <a:bodyPr/>
+          <a:lstStyle/>
+          <a:p>
+            <a:fld id="{2396986B-09E1-422F-9D6D-F3432B0D2D09}" type="slidenum">
+              <a:rPr lang="en-GB" smtClean="0"/>
+              <a:t>22</a:t>
+            </a:fld>
+            <a:endParaRPr lang="en-GB"/>
+          </a:p>
+        </p:txBody>
+      </p:sp>
+      <p:pic>
+        <p:nvPicPr>
+          <p:cNvPr id="7" name="Obrázek 6">
+            <a:extLst>
+              <a:ext uri="{FF2B5EF4-FFF2-40B4-BE49-F238E27FC236}">
+                <a16:creationId xmlns:a16="http://schemas.microsoft.com/office/drawing/2014/main" id="{42C9C5F8-45A3-7588-5E5A-96B6E799EEAA}"/>
+              </a:ext>
+            </a:extLst>
+          </p:cNvPr>
+          <p:cNvPicPr>
+            <a:picLocks noChangeAspect="1"/>
+          </p:cNvPicPr>
+          <p:nvPr/>
+        </p:nvPicPr>
+        <p:blipFill>
+          <a:blip r:embed="rId2"/>
+          <a:stretch>
+            <a:fillRect/>
+          </a:stretch>
+        </p:blipFill>
+        <p:spPr>
+          <a:xfrm>
+            <a:off x="10113527" y="299406"/>
+            <a:ext cx="1556365" cy="493482"/>
+          </a:xfrm>
+          <a:prstGeom prst="rect">
+            <a:avLst/>
+          </a:prstGeom>
+        </p:spPr>
+      </p:pic>
+      <p:sp>
+        <p:nvSpPr>
+          <p:cNvPr id="8" name="Obdélník 7">
+            <a:extLst>
+              <a:ext uri="{FF2B5EF4-FFF2-40B4-BE49-F238E27FC236}">
+                <a16:creationId xmlns:a16="http://schemas.microsoft.com/office/drawing/2014/main" id="{D2798C63-D0C7-8503-BE22-A0C93FE44363}"/>
+              </a:ext>
+            </a:extLst>
+          </p:cNvPr>
+          <p:cNvSpPr/>
+          <p:nvPr/>
+        </p:nvSpPr>
+        <p:spPr>
+          <a:xfrm>
+            <a:off x="-1349" y="1070983"/>
+            <a:ext cx="860453" cy="45719"/>
+          </a:xfrm>
+          <a:prstGeom prst="rect">
+            <a:avLst/>
+          </a:prstGeom>
+          <a:solidFill>
+            <a:srgbClr val="FF0000"/>
+          </a:solidFill>
+          <a:ln>
+            <a:noFill/>
+          </a:ln>
+        </p:spPr>
+        <p:style>
+          <a:lnRef idx="2">
+            <a:schemeClr val="accent1">
+              <a:shade val="15000"/>
+            </a:schemeClr>
+          </a:lnRef>
+          <a:fillRef idx="1">
+            <a:schemeClr val="accent1"/>
+          </a:fillRef>
+          <a:effectRef idx="0">
+            <a:schemeClr val="accent1"/>
+          </a:effectRef>
+          <a:fontRef idx="minor">
+            <a:schemeClr val="lt1"/>
+          </a:fontRef>
+        </p:style>
+        <p:txBody>
+          <a:bodyPr rtlCol="0" anchor="ctr"/>
+          <a:lstStyle/>
+          <a:p>
+            <a:pPr algn="ctr"/>
+            <a:endParaRPr lang="en-GB"/>
+          </a:p>
+        </p:txBody>
+      </p:sp>
     </p:spTree>
     <p:extLst>
       <p:ext uri="{BB962C8B-B14F-4D97-AF65-F5344CB8AC3E}">
@@ -10984,7 +11373,7 @@
 </p:sld>
 </file>
 
-<file path=ppt/slides/slide22.xml><?xml version="1.0" encoding="utf-8"?>
+<file path=ppt/slides/slide23.xml><?xml version="1.0" encoding="utf-8"?>
 <p:sld xmlns:a="http://schemas.openxmlformats.org/drawingml/2006/main" xmlns:r="http://schemas.openxmlformats.org/officeDocument/2006/relationships" xmlns:p="http://schemas.openxmlformats.org/presentationml/2006/main">
   <p:cSld>
     <p:spTree>
@@ -11114,7 +11503,7 @@
           <a:p>
             <a:fld id="{2396986B-09E1-422F-9D6D-F3432B0D2D09}" type="slidenum">
               <a:rPr lang="en-GB" smtClean="0"/>
-              <a:t>22</a:t>
+              <a:t>23</a:t>
             </a:fld>
             <a:endParaRPr lang="en-GB"/>
           </a:p>

</xml_diff>

<commit_message>
uprava diakritiky a překlepu
</commit_message>
<xml_diff>
--- a/docs/p2ppost_prezentace.pptx
+++ b/docs/p2ppost_prezentace.pptx
@@ -6089,7 +6089,7 @@
             </a:pPr>
             <a:r>
               <a:rPr lang="cs-CZ" dirty="0"/>
-              <a:t>Zde se</a:t>
+              <a:t>Zde se </a:t>
             </a:r>
             <a:r>
               <a:rPr lang="en-GB" dirty="0" err="1"/>
@@ -6174,10 +6174,6 @@
             <a:r>
               <a:rPr lang="en-GB" dirty="0" err="1"/>
               <a:t>podpis</a:t>
-            </a:r>
-            <a:r>
-              <a:rPr lang="en-GB" dirty="0"/>
-              <a:t>.</a:t>
             </a:r>
             <a:endParaRPr lang="cs-CZ" dirty="0"/>
           </a:p>
@@ -10345,7 +10341,7 @@
         </p:spPr>
         <p:txBody>
           <a:bodyPr>
-            <a:normAutofit fontScale="92500" lnSpcReduction="20000"/>
+            <a:normAutofit lnSpcReduction="10000"/>
           </a:bodyPr>
           <a:lstStyle/>
           <a:p>
@@ -10369,25 +10365,19 @@
           <a:p>
             <a:r>
               <a:rPr lang="cs-CZ" dirty="0"/>
+              <a:t>Implementační detaily</a:t>
+            </a:r>
+          </a:p>
+          <a:p>
+            <a:r>
+              <a:rPr lang="cs-CZ" dirty="0"/>
               <a:t>Architektura</a:t>
             </a:r>
           </a:p>
           <a:p>
             <a:r>
               <a:rPr lang="cs-CZ" dirty="0"/>
-              <a:t>Bezpečnostní model</a:t>
-            </a:r>
-          </a:p>
-          <a:p>
-            <a:r>
-              <a:rPr lang="cs-CZ" dirty="0"/>
-              <a:t>Implementace</a:t>
-            </a:r>
-          </a:p>
-          <a:p>
-            <a:r>
-              <a:rPr lang="cs-CZ" dirty="0"/>
-              <a:t>Datové toky a komunikace</a:t>
+              <a:t>Datové toky a komunikace </a:t>
             </a:r>
           </a:p>
           <a:p>
@@ -12064,11 +12054,11 @@
           <a:p>
             <a:r>
               <a:rPr lang="cs-CZ" dirty="0"/>
-              <a:t>Děkujeme za </a:t>
-            </a:r>
-            <a:r>
-              <a:rPr lang="cs-CZ" dirty="0" err="1"/>
-              <a:t>pozoronost</a:t>
+              <a:t>Děkujeme </a:t>
+            </a:r>
+            <a:r>
+              <a:rPr lang="cs-CZ"/>
+              <a:t>za pozornost</a:t>
             </a:r>
             <a:endParaRPr lang="en-GB" dirty="0"/>
           </a:p>

</xml_diff>